<commit_message>
Updated day 3 slides. Added day 3 homework
</commit_message>
<xml_diff>
--- a/day3/Elixir - Day 3.pptx
+++ b/day3/Elixir - Day 3.pptx
@@ -5,7 +5,7 @@
     <p:sldMasterId id="2147483648" r:id="rId5"/>
   </p:sldMasterIdLst>
   <p:notesMasterIdLst>
-    <p:notesMasterId r:id="rId25"/>
+    <p:notesMasterId r:id="rId27"/>
   </p:notesMasterIdLst>
   <p:sldIdLst>
     <p:sldId id="276" r:id="rId6"/>
@@ -20,13 +20,15 @@
     <p:sldId id="337" r:id="rId15"/>
     <p:sldId id="338" r:id="rId16"/>
     <p:sldId id="332" r:id="rId17"/>
-    <p:sldId id="339" r:id="rId18"/>
-    <p:sldId id="340" r:id="rId19"/>
-    <p:sldId id="341" r:id="rId20"/>
-    <p:sldId id="343" r:id="rId21"/>
-    <p:sldId id="342" r:id="rId22"/>
-    <p:sldId id="287" r:id="rId23"/>
-    <p:sldId id="299" r:id="rId24"/>
+    <p:sldId id="345" r:id="rId18"/>
+    <p:sldId id="346" r:id="rId19"/>
+    <p:sldId id="339" r:id="rId20"/>
+    <p:sldId id="340" r:id="rId21"/>
+    <p:sldId id="341" r:id="rId22"/>
+    <p:sldId id="343" r:id="rId23"/>
+    <p:sldId id="342" r:id="rId24"/>
+    <p:sldId id="287" r:id="rId25"/>
+    <p:sldId id="299" r:id="rId26"/>
   </p:sldIdLst>
   <p:sldSz cx="12192000" cy="6858000"/>
   <p:notesSz cx="6858000" cy="9144000"/>
@@ -636,6 +638,90 @@
 </file>
 
 <file path=ppt/notesSlides/notesSlide3.xml><?xml version="1.0" encoding="utf-8"?>
+<p:notes xmlns:a="http://schemas.openxmlformats.org/drawingml/2006/main" xmlns:r="http://schemas.openxmlformats.org/officeDocument/2006/relationships" xmlns:p="http://schemas.openxmlformats.org/presentationml/2006/main">
+  <p:cSld>
+    <p:spTree>
+      <p:nvGrpSpPr>
+        <p:cNvPr id="1" name="">
+          <a:extLst>
+            <a:ext uri="{FF2B5EF4-FFF2-40B4-BE49-F238E27FC236}">
+              <a16:creationId xmlns:a16="http://schemas.microsoft.com/office/drawing/2014/main" id="{AB2E7A54-7D01-115E-16B0-4A92BD325F9C}"/>
+            </a:ext>
+          </a:extLst>
+        </p:cNvPr>
+        <p:cNvGrpSpPr/>
+        <p:nvPr/>
+      </p:nvGrpSpPr>
+      <p:grpSpPr>
+        <a:xfrm>
+          <a:off x="0" y="0"/>
+          <a:ext cx="0" cy="0"/>
+          <a:chOff x="0" y="0"/>
+          <a:chExt cx="0" cy="0"/>
+        </a:xfrm>
+      </p:grpSpPr>
+      <p:sp>
+        <p:nvSpPr>
+          <p:cNvPr id="2" name="Slide Image Placeholder 1">
+            <a:extLst>
+              <a:ext uri="{FF2B5EF4-FFF2-40B4-BE49-F238E27FC236}">
+                <a16:creationId xmlns:a16="http://schemas.microsoft.com/office/drawing/2014/main" id="{5CF6AA28-8F57-1394-D690-69960B61DF82}"/>
+              </a:ext>
+            </a:extLst>
+          </p:cNvPr>
+          <p:cNvSpPr>
+            <a:spLocks noGrp="1" noRot="1" noChangeAspect="1"/>
+          </p:cNvSpPr>
+          <p:nvPr>
+            <p:ph type="sldImg"/>
+          </p:nvPr>
+        </p:nvSpPr>
+        <p:spPr>
+          <a:xfrm>
+            <a:off x="381000" y="685800"/>
+            <a:ext cx="6096000" cy="3429000"/>
+          </a:xfrm>
+        </p:spPr>
+      </p:sp>
+      <p:sp>
+        <p:nvSpPr>
+          <p:cNvPr id="3" name="Notes Placeholder 2">
+            <a:extLst>
+              <a:ext uri="{FF2B5EF4-FFF2-40B4-BE49-F238E27FC236}">
+                <a16:creationId xmlns:a16="http://schemas.microsoft.com/office/drawing/2014/main" id="{2605FDA0-67CC-B0AC-3B4D-F28ED715CB27}"/>
+              </a:ext>
+            </a:extLst>
+          </p:cNvPr>
+          <p:cNvSpPr>
+            <a:spLocks noGrp="1"/>
+          </p:cNvSpPr>
+          <p:nvPr>
+            <p:ph type="body" idx="1"/>
+          </p:nvPr>
+        </p:nvSpPr>
+        <p:spPr/>
+        <p:txBody>
+          <a:bodyPr/>
+          <a:lstStyle/>
+          <a:p>
+            <a:endParaRPr lang="en-US" dirty="0"/>
+          </a:p>
+        </p:txBody>
+      </p:sp>
+    </p:spTree>
+    <p:extLst>
+      <p:ext uri="{BB962C8B-B14F-4D97-AF65-F5344CB8AC3E}">
+        <p14:creationId xmlns:p14="http://schemas.microsoft.com/office/powerpoint/2010/main" val="3864803723"/>
+      </p:ext>
+    </p:extLst>
+  </p:cSld>
+  <p:clrMapOvr>
+    <a:masterClrMapping/>
+  </p:clrMapOvr>
+</p:notes>
+</file>
+
+<file path=ppt/notesSlides/notesSlide4.xml><?xml version="1.0" encoding="utf-8"?>
 <p:notes xmlns:a="http://schemas.openxmlformats.org/drawingml/2006/main" xmlns:r="http://schemas.openxmlformats.org/officeDocument/2006/relationships" xmlns:p="http://schemas.openxmlformats.org/presentationml/2006/main">
   <p:cSld>
     <p:spTree>
@@ -3528,7 +3614,7 @@
           <a:p>
             <a:r>
               <a:rPr lang="en-US" dirty="0" err="1"/>
-              <a:t>Controlelr</a:t>
+              <a:t>ControllEr</a:t>
             </a:r>
             <a:r>
               <a:rPr lang="en-US" dirty="0"/>
@@ -3591,7 +3677,7 @@
           <a:p>
             <a:r>
               <a:rPr lang="en-US" dirty="0"/>
-              <a:t>render/3 – renders a HTML template, along with some data</a:t>
+              <a:t>render/3 – renders a resource in the according format (HTML/JSON)</a:t>
             </a:r>
           </a:p>
           <a:p>
@@ -3807,6 +3893,559 @@
           <p:cNvPr id="4" name="Title 3">
             <a:extLst>
               <a:ext uri="{FF2B5EF4-FFF2-40B4-BE49-F238E27FC236}">
+                <a16:creationId xmlns:a16="http://schemas.microsoft.com/office/drawing/2014/main" id="{FEBF92DB-329F-801C-6442-772929CB0E68}"/>
+              </a:ext>
+            </a:extLst>
+          </p:cNvPr>
+          <p:cNvSpPr>
+            <a:spLocks noGrp="1"/>
+          </p:cNvSpPr>
+          <p:nvPr>
+            <p:ph type="title"/>
+          </p:nvPr>
+        </p:nvSpPr>
+        <p:spPr/>
+        <p:txBody>
+          <a:bodyPr/>
+          <a:lstStyle/>
+          <a:p>
+            <a:r>
+              <a:rPr lang="en-US" dirty="0"/>
+              <a:t>Working with resources</a:t>
+            </a:r>
+            <a:endParaRPr lang="bg-BG" dirty="0"/>
+          </a:p>
+        </p:txBody>
+      </p:sp>
+      <p:sp>
+        <p:nvSpPr>
+          <p:cNvPr id="5" name="Text Placeholder 4">
+            <a:extLst>
+              <a:ext uri="{FF2B5EF4-FFF2-40B4-BE49-F238E27FC236}">
+                <a16:creationId xmlns:a16="http://schemas.microsoft.com/office/drawing/2014/main" id="{6CC85F3B-A8DB-3F98-5F7D-52B47F7104AE}"/>
+              </a:ext>
+            </a:extLst>
+          </p:cNvPr>
+          <p:cNvSpPr>
+            <a:spLocks noGrp="1"/>
+          </p:cNvSpPr>
+          <p:nvPr>
+            <p:ph type="body" idx="1"/>
+          </p:nvPr>
+        </p:nvSpPr>
+        <p:spPr/>
+        <p:txBody>
+          <a:bodyPr/>
+          <a:lstStyle/>
+          <a:p>
+            <a:r>
+              <a:rPr lang="en-US" dirty="0"/>
+              <a:t>Phoenix supports scaffolding CRUD features for a given resource</a:t>
+            </a:r>
+          </a:p>
+          <a:p>
+            <a:endParaRPr lang="en-US" dirty="0"/>
+          </a:p>
+          <a:p>
+            <a:r>
+              <a:rPr lang="en-US" dirty="0"/>
+              <a:t>We can easily generate DB migrations, entities, contexts, controller actions and routes</a:t>
+            </a:r>
+          </a:p>
+          <a:p>
+            <a:endParaRPr lang="en-US" dirty="0"/>
+          </a:p>
+          <a:p>
+            <a:r>
+              <a:rPr lang="en-US" dirty="0"/>
+              <a:t>Sample commands</a:t>
+            </a:r>
+          </a:p>
+          <a:p>
+            <a:pPr lvl="1"/>
+            <a:endParaRPr lang="bg-BG" dirty="0"/>
+          </a:p>
+        </p:txBody>
+      </p:sp>
+      <p:sp>
+        <p:nvSpPr>
+          <p:cNvPr id="6" name="Rectangle 5">
+            <a:extLst>
+              <a:ext uri="{FF2B5EF4-FFF2-40B4-BE49-F238E27FC236}">
+                <a16:creationId xmlns:a16="http://schemas.microsoft.com/office/drawing/2014/main" id="{D13AE607-AB4D-15B3-064B-4CF48DAA6413}"/>
+              </a:ext>
+            </a:extLst>
+          </p:cNvPr>
+          <p:cNvSpPr/>
+          <p:nvPr/>
+        </p:nvSpPr>
+        <p:spPr>
+          <a:xfrm>
+            <a:off x="1194816" y="4237639"/>
+            <a:ext cx="10158984" cy="444220"/>
+          </a:xfrm>
+          <a:prstGeom prst="rect">
+            <a:avLst/>
+          </a:prstGeom>
+          <a:solidFill>
+            <a:srgbClr val="F9F9F9"/>
+          </a:solidFill>
+          <a:ln w="25400" cap="flat">
+            <a:solidFill>
+              <a:schemeClr val="accent1"/>
+            </a:solidFill>
+            <a:prstDash val="solid"/>
+            <a:round/>
+          </a:ln>
+          <a:effectLst/>
+          <a:sp3d/>
+        </p:spPr>
+        <p:style>
+          <a:lnRef idx="0">
+            <a:scrgbClr r="0" g="0" b="0"/>
+          </a:lnRef>
+          <a:fillRef idx="0">
+            <a:scrgbClr r="0" g="0" b="0"/>
+          </a:fillRef>
+          <a:effectRef idx="0">
+            <a:scrgbClr r="0" g="0" b="0"/>
+          </a:effectRef>
+          <a:fontRef idx="none"/>
+        </p:style>
+        <p:txBody>
+          <a:bodyPr rot="0" spcFirstLastPara="1" vertOverflow="overflow" horzOverflow="overflow" vert="horz" wrap="square" lIns="45718" tIns="45718" rIns="45718" bIns="45718" numCol="1" spcCol="38100" rtlCol="0" anchor="ctr">
+            <a:spAutoFit/>
+          </a:bodyPr>
+          <a:lstStyle/>
+          <a:p>
+            <a:r>
+              <a:rPr lang="en-US" sz="1800" dirty="0">
+                <a:solidFill>
+                  <a:srgbClr val="24292E"/>
+                </a:solidFill>
+                <a:highlight>
+                  <a:srgbClr val="F9F9F9"/>
+                </a:highlight>
+                <a:latin typeface="Cascadia Code" panose="020B0609020000020004" pitchFamily="49" charset="0"/>
+              </a:rPr>
+              <a:t>$ mix phx.gen.html </a:t>
+            </a:r>
+            <a:r>
+              <a:rPr lang="en-US" sz="1800" dirty="0" err="1">
+                <a:solidFill>
+                  <a:srgbClr val="24292E"/>
+                </a:solidFill>
+                <a:highlight>
+                  <a:srgbClr val="F9F9F9"/>
+                </a:highlight>
+                <a:latin typeface="Cascadia Code" panose="020B0609020000020004" pitchFamily="49" charset="0"/>
+              </a:rPr>
+              <a:t>UserService</a:t>
+            </a:r>
+            <a:r>
+              <a:rPr lang="en-US" sz="1800" dirty="0">
+                <a:solidFill>
+                  <a:srgbClr val="24292E"/>
+                </a:solidFill>
+                <a:highlight>
+                  <a:srgbClr val="F9F9F9"/>
+                </a:highlight>
+                <a:latin typeface="Cascadia Code" panose="020B0609020000020004" pitchFamily="49" charset="0"/>
+              </a:rPr>
+              <a:t> User users </a:t>
+            </a:r>
+            <a:r>
+              <a:rPr lang="en-US" sz="1800" dirty="0" err="1">
+                <a:solidFill>
+                  <a:srgbClr val="24292E"/>
+                </a:solidFill>
+                <a:highlight>
+                  <a:srgbClr val="F9F9F9"/>
+                </a:highlight>
+                <a:latin typeface="Cascadia Code" panose="020B0609020000020004" pitchFamily="49" charset="0"/>
+              </a:rPr>
+              <a:t>name:string</a:t>
+            </a:r>
+            <a:r>
+              <a:rPr lang="en-US" sz="1800" dirty="0">
+                <a:solidFill>
+                  <a:srgbClr val="24292E"/>
+                </a:solidFill>
+                <a:highlight>
+                  <a:srgbClr val="F9F9F9"/>
+                </a:highlight>
+                <a:latin typeface="Cascadia Code" panose="020B0609020000020004" pitchFamily="49" charset="0"/>
+              </a:rPr>
+              <a:t> </a:t>
+            </a:r>
+            <a:r>
+              <a:rPr lang="en-US" sz="1800" dirty="0" err="1">
+                <a:solidFill>
+                  <a:srgbClr val="24292E"/>
+                </a:solidFill>
+                <a:highlight>
+                  <a:srgbClr val="F9F9F9"/>
+                </a:highlight>
+                <a:latin typeface="Cascadia Code" panose="020B0609020000020004" pitchFamily="49" charset="0"/>
+              </a:rPr>
+              <a:t>age:integer</a:t>
+            </a:r>
+            <a:endParaRPr lang="en-US" sz="1800" b="0" dirty="0">
+              <a:solidFill>
+                <a:srgbClr val="24292E"/>
+              </a:solidFill>
+              <a:effectLst/>
+              <a:highlight>
+                <a:srgbClr val="F9F9F9"/>
+              </a:highlight>
+              <a:latin typeface="Cascadia Code" panose="020B0609020000020004" pitchFamily="49" charset="0"/>
+            </a:endParaRPr>
+          </a:p>
+        </p:txBody>
+      </p:sp>
+      <p:sp>
+        <p:nvSpPr>
+          <p:cNvPr id="7" name="Rectangle 6">
+            <a:extLst>
+              <a:ext uri="{FF2B5EF4-FFF2-40B4-BE49-F238E27FC236}">
+                <a16:creationId xmlns:a16="http://schemas.microsoft.com/office/drawing/2014/main" id="{A1F23297-0DC9-2852-35F7-E058AABB15F3}"/>
+              </a:ext>
+            </a:extLst>
+          </p:cNvPr>
+          <p:cNvSpPr/>
+          <p:nvPr/>
+        </p:nvSpPr>
+        <p:spPr>
+          <a:xfrm>
+            <a:off x="1194816" y="5189237"/>
+            <a:ext cx="10158984" cy="444220"/>
+          </a:xfrm>
+          <a:prstGeom prst="rect">
+            <a:avLst/>
+          </a:prstGeom>
+          <a:solidFill>
+            <a:srgbClr val="F9F9F9"/>
+          </a:solidFill>
+          <a:ln w="25400" cap="flat">
+            <a:solidFill>
+              <a:schemeClr val="accent1"/>
+            </a:solidFill>
+            <a:prstDash val="solid"/>
+            <a:round/>
+          </a:ln>
+          <a:effectLst/>
+          <a:sp3d/>
+        </p:spPr>
+        <p:style>
+          <a:lnRef idx="0">
+            <a:scrgbClr r="0" g="0" b="0"/>
+          </a:lnRef>
+          <a:fillRef idx="0">
+            <a:scrgbClr r="0" g="0" b="0"/>
+          </a:fillRef>
+          <a:effectRef idx="0">
+            <a:scrgbClr r="0" g="0" b="0"/>
+          </a:effectRef>
+          <a:fontRef idx="none"/>
+        </p:style>
+        <p:txBody>
+          <a:bodyPr rot="0" spcFirstLastPara="1" vertOverflow="overflow" horzOverflow="overflow" vert="horz" wrap="square" lIns="45718" tIns="45718" rIns="45718" bIns="45718" numCol="1" spcCol="38100" rtlCol="0" anchor="ctr">
+            <a:spAutoFit/>
+          </a:bodyPr>
+          <a:lstStyle/>
+          <a:p>
+            <a:r>
+              <a:rPr lang="en-US" sz="1800" dirty="0">
+                <a:solidFill>
+                  <a:srgbClr val="24292E"/>
+                </a:solidFill>
+                <a:highlight>
+                  <a:srgbClr val="F9F9F9"/>
+                </a:highlight>
+                <a:latin typeface="Cascadia Code" panose="020B0609020000020004" pitchFamily="49" charset="0"/>
+              </a:rPr>
+              <a:t>$ mix </a:t>
+            </a:r>
+            <a:r>
+              <a:rPr lang="en-US" sz="1800" dirty="0" err="1">
+                <a:solidFill>
+                  <a:srgbClr val="24292E"/>
+                </a:solidFill>
+                <a:highlight>
+                  <a:srgbClr val="F9F9F9"/>
+                </a:highlight>
+                <a:latin typeface="Cascadia Code" panose="020B0609020000020004" pitchFamily="49" charset="0"/>
+              </a:rPr>
+              <a:t>phx.gen.json</a:t>
+            </a:r>
+            <a:r>
+              <a:rPr lang="en-US" sz="1800" dirty="0">
+                <a:solidFill>
+                  <a:srgbClr val="24292E"/>
+                </a:solidFill>
+                <a:highlight>
+                  <a:srgbClr val="F9F9F9"/>
+                </a:highlight>
+                <a:latin typeface="Cascadia Code" panose="020B0609020000020004" pitchFamily="49" charset="0"/>
+              </a:rPr>
+              <a:t> </a:t>
+            </a:r>
+            <a:r>
+              <a:rPr lang="en-US" sz="1800" dirty="0" err="1">
+                <a:solidFill>
+                  <a:srgbClr val="24292E"/>
+                </a:solidFill>
+                <a:highlight>
+                  <a:srgbClr val="F9F9F9"/>
+                </a:highlight>
+                <a:latin typeface="Cascadia Code" panose="020B0609020000020004" pitchFamily="49" charset="0"/>
+              </a:rPr>
+              <a:t>UserService</a:t>
+            </a:r>
+            <a:r>
+              <a:rPr lang="en-US" sz="1800" dirty="0">
+                <a:solidFill>
+                  <a:srgbClr val="24292E"/>
+                </a:solidFill>
+                <a:highlight>
+                  <a:srgbClr val="F9F9F9"/>
+                </a:highlight>
+                <a:latin typeface="Cascadia Code" panose="020B0609020000020004" pitchFamily="49" charset="0"/>
+              </a:rPr>
+              <a:t> User users </a:t>
+            </a:r>
+            <a:r>
+              <a:rPr lang="en-US" sz="1800" dirty="0" err="1">
+                <a:solidFill>
+                  <a:srgbClr val="24292E"/>
+                </a:solidFill>
+                <a:highlight>
+                  <a:srgbClr val="F9F9F9"/>
+                </a:highlight>
+                <a:latin typeface="Cascadia Code" panose="020B0609020000020004" pitchFamily="49" charset="0"/>
+              </a:rPr>
+              <a:t>name:string</a:t>
+            </a:r>
+            <a:r>
+              <a:rPr lang="en-US" sz="1800" dirty="0">
+                <a:solidFill>
+                  <a:srgbClr val="24292E"/>
+                </a:solidFill>
+                <a:highlight>
+                  <a:srgbClr val="F9F9F9"/>
+                </a:highlight>
+                <a:latin typeface="Cascadia Code" panose="020B0609020000020004" pitchFamily="49" charset="0"/>
+              </a:rPr>
+              <a:t> </a:t>
+            </a:r>
+            <a:r>
+              <a:rPr lang="en-US" sz="1800" dirty="0" err="1">
+                <a:solidFill>
+                  <a:srgbClr val="24292E"/>
+                </a:solidFill>
+                <a:highlight>
+                  <a:srgbClr val="F9F9F9"/>
+                </a:highlight>
+                <a:latin typeface="Cascadia Code" panose="020B0609020000020004" pitchFamily="49" charset="0"/>
+              </a:rPr>
+              <a:t>age:integer</a:t>
+            </a:r>
+            <a:endParaRPr lang="en-US" sz="1800" b="0" dirty="0">
+              <a:solidFill>
+                <a:srgbClr val="24292E"/>
+              </a:solidFill>
+              <a:effectLst/>
+              <a:highlight>
+                <a:srgbClr val="F9F9F9"/>
+              </a:highlight>
+              <a:latin typeface="Cascadia Code" panose="020B0609020000020004" pitchFamily="49" charset="0"/>
+            </a:endParaRPr>
+          </a:p>
+        </p:txBody>
+      </p:sp>
+    </p:spTree>
+    <p:extLst>
+      <p:ext uri="{BB962C8B-B14F-4D97-AF65-F5344CB8AC3E}">
+        <p14:creationId xmlns:p14="http://schemas.microsoft.com/office/powerpoint/2010/main" val="1447021595"/>
+      </p:ext>
+    </p:extLst>
+  </p:cSld>
+  <p:clrMapOvr>
+    <a:masterClrMapping/>
+  </p:clrMapOvr>
+  <p:transition spd="med"/>
+</p:sld>
+</file>
+
+<file path=ppt/slides/slide14.xml><?xml version="1.0" encoding="utf-8"?>
+<p:sld xmlns:a="http://schemas.openxmlformats.org/drawingml/2006/main" xmlns:r="http://schemas.openxmlformats.org/officeDocument/2006/relationships" xmlns:p="http://schemas.openxmlformats.org/presentationml/2006/main">
+  <p:cSld>
+    <p:spTree>
+      <p:nvGrpSpPr>
+        <p:cNvPr id="1" name="">
+          <a:extLst>
+            <a:ext uri="{FF2B5EF4-FFF2-40B4-BE49-F238E27FC236}">
+              <a16:creationId xmlns:a16="http://schemas.microsoft.com/office/drawing/2014/main" id="{9774348A-54B5-9C45-6FA7-F37DAA8F2FB3}"/>
+            </a:ext>
+          </a:extLst>
+        </p:cNvPr>
+        <p:cNvGrpSpPr/>
+        <p:nvPr/>
+      </p:nvGrpSpPr>
+      <p:grpSpPr>
+        <a:xfrm>
+          <a:off x="0" y="0"/>
+          <a:ext cx="0" cy="0"/>
+          <a:chOff x="0" y="0"/>
+          <a:chExt cx="0" cy="0"/>
+        </a:xfrm>
+      </p:grpSpPr>
+      <p:sp>
+        <p:nvSpPr>
+          <p:cNvPr id="4" name="Title 3">
+            <a:extLst>
+              <a:ext uri="{FF2B5EF4-FFF2-40B4-BE49-F238E27FC236}">
+                <a16:creationId xmlns:a16="http://schemas.microsoft.com/office/drawing/2014/main" id="{15D34E17-8B4F-8AF4-DBD2-C5B86122AFFD}"/>
+              </a:ext>
+            </a:extLst>
+          </p:cNvPr>
+          <p:cNvSpPr>
+            <a:spLocks noGrp="1"/>
+          </p:cNvSpPr>
+          <p:nvPr>
+            <p:ph type="title"/>
+          </p:nvPr>
+        </p:nvSpPr>
+        <p:spPr>
+          <a:xfrm>
+            <a:off x="885440" y="1597396"/>
+            <a:ext cx="4939048" cy="1076082"/>
+          </a:xfrm>
+        </p:spPr>
+        <p:txBody>
+          <a:bodyPr/>
+          <a:lstStyle/>
+          <a:p>
+            <a:r>
+              <a:rPr lang="en-US" dirty="0"/>
+              <a:t>Demo</a:t>
+            </a:r>
+          </a:p>
+        </p:txBody>
+      </p:sp>
+      <p:sp>
+        <p:nvSpPr>
+          <p:cNvPr id="5" name="Text Placeholder 4">
+            <a:extLst>
+              <a:ext uri="{FF2B5EF4-FFF2-40B4-BE49-F238E27FC236}">
+                <a16:creationId xmlns:a16="http://schemas.microsoft.com/office/drawing/2014/main" id="{8392FDF0-0FD8-62D2-CA4D-B16744C0F1AF}"/>
+              </a:ext>
+            </a:extLst>
+          </p:cNvPr>
+          <p:cNvSpPr>
+            <a:spLocks noGrp="1"/>
+          </p:cNvSpPr>
+          <p:nvPr>
+            <p:ph type="body" sz="quarter" idx="1"/>
+          </p:nvPr>
+        </p:nvSpPr>
+        <p:spPr>
+          <a:xfrm>
+            <a:off x="885440" y="2805606"/>
+            <a:ext cx="5031977" cy="1246787"/>
+          </a:xfrm>
+        </p:spPr>
+        <p:txBody>
+          <a:bodyPr/>
+          <a:lstStyle/>
+          <a:p>
+            <a:endParaRPr lang="en-US" dirty="0"/>
+          </a:p>
+        </p:txBody>
+      </p:sp>
+      <p:pic>
+        <p:nvPicPr>
+          <p:cNvPr id="2050" name="Picture 2">
+            <a:extLst>
+              <a:ext uri="{FF2B5EF4-FFF2-40B4-BE49-F238E27FC236}">
+                <a16:creationId xmlns:a16="http://schemas.microsoft.com/office/drawing/2014/main" id="{7452D58D-C443-AFAE-FE7B-E93972688B11}"/>
+              </a:ext>
+            </a:extLst>
+          </p:cNvPr>
+          <p:cNvPicPr>
+            <a:picLocks noChangeAspect="1" noChangeArrowheads="1"/>
+          </p:cNvPicPr>
+          <p:nvPr/>
+        </p:nvPicPr>
+        <p:blipFill>
+          <a:blip r:embed="rId3">
+            <a:extLst>
+              <a:ext uri="{28A0092B-C50C-407E-A947-70E740481C1C}">
+                <a14:useLocalDpi xmlns:a14="http://schemas.microsoft.com/office/drawing/2010/main" val="0"/>
+              </a:ext>
+            </a:extLst>
+          </a:blip>
+          <a:srcRect/>
+          <a:stretch>
+            <a:fillRect/>
+          </a:stretch>
+        </p:blipFill>
+        <p:spPr bwMode="auto">
+          <a:xfrm>
+            <a:off x="5160320" y="1387603"/>
+            <a:ext cx="2571750" cy="2571750"/>
+          </a:xfrm>
+          <a:prstGeom prst="rect">
+            <a:avLst/>
+          </a:prstGeom>
+          <a:noFill/>
+          <a:extLst>
+            <a:ext uri="{909E8E84-426E-40DD-AFC4-6F175D3DCCD1}">
+              <a14:hiddenFill xmlns:a14="http://schemas.microsoft.com/office/drawing/2010/main">
+                <a:solidFill>
+                  <a:srgbClr val="FFFFFF"/>
+                </a:solidFill>
+              </a14:hiddenFill>
+            </a:ext>
+          </a:extLst>
+        </p:spPr>
+      </p:pic>
+    </p:spTree>
+    <p:extLst>
+      <p:ext uri="{BB962C8B-B14F-4D97-AF65-F5344CB8AC3E}">
+        <p14:creationId xmlns:p14="http://schemas.microsoft.com/office/powerpoint/2010/main" val="3227549932"/>
+      </p:ext>
+    </p:extLst>
+  </p:cSld>
+  <p:clrMapOvr>
+    <a:masterClrMapping/>
+  </p:clrMapOvr>
+  <p:transition spd="med"/>
+</p:sld>
+</file>
+
+<file path=ppt/slides/slide15.xml><?xml version="1.0" encoding="utf-8"?>
+<p:sld xmlns:a="http://schemas.openxmlformats.org/drawingml/2006/main" xmlns:r="http://schemas.openxmlformats.org/officeDocument/2006/relationships" xmlns:p="http://schemas.openxmlformats.org/presentationml/2006/main">
+  <p:cSld>
+    <p:spTree>
+      <p:nvGrpSpPr>
+        <p:cNvPr id="1" name=""/>
+        <p:cNvGrpSpPr/>
+        <p:nvPr/>
+      </p:nvGrpSpPr>
+      <p:grpSpPr>
+        <a:xfrm>
+          <a:off x="0" y="0"/>
+          <a:ext cx="0" cy="0"/>
+          <a:chOff x="0" y="0"/>
+          <a:chExt cx="0" cy="0"/>
+        </a:xfrm>
+      </p:grpSpPr>
+      <p:sp>
+        <p:nvSpPr>
+          <p:cNvPr id="4" name="Title 3">
+            <a:extLst>
+              <a:ext uri="{FF2B5EF4-FFF2-40B4-BE49-F238E27FC236}">
                 <a16:creationId xmlns:a16="http://schemas.microsoft.com/office/drawing/2014/main" id="{99939344-6101-DB74-ACE7-6B18C4FE6420}"/>
               </a:ext>
             </a:extLst>
@@ -3913,7 +4552,7 @@
 </p:sld>
 </file>
 
-<file path=ppt/slides/slide14.xml><?xml version="1.0" encoding="utf-8"?>
+<file path=ppt/slides/slide16.xml><?xml version="1.0" encoding="utf-8"?>
 <p:sld xmlns:a="http://schemas.openxmlformats.org/drawingml/2006/main" xmlns:r="http://schemas.openxmlformats.org/officeDocument/2006/relationships" xmlns:p="http://schemas.openxmlformats.org/presentationml/2006/main">
   <p:cSld>
     <p:spTree>
@@ -4033,7 +4672,7 @@
 </p:sld>
 </file>
 
-<file path=ppt/slides/slide15.xml><?xml version="1.0" encoding="utf-8"?>
+<file path=ppt/slides/slide17.xml><?xml version="1.0" encoding="utf-8"?>
 <p:sld xmlns:a="http://schemas.openxmlformats.org/drawingml/2006/main" xmlns:r="http://schemas.openxmlformats.org/officeDocument/2006/relationships" xmlns:p="http://schemas.openxmlformats.org/presentationml/2006/main">
   <p:cSld>
     <p:spTree>
@@ -4118,8 +4757,12 @@
           <a:p>
             <a:pPr lvl="1"/>
             <a:r>
+              <a:rPr lang="en-US" b="1" dirty="0"/>
+              <a:t>render</a:t>
+            </a:r>
+            <a:r>
               <a:rPr lang="en-US" dirty="0"/>
-              <a:t>render – returns the </a:t>
+              <a:t> – returns the </a:t>
             </a:r>
             <a:r>
               <a:rPr lang="en-US" dirty="0" err="1"/>
@@ -4137,8 +4780,12 @@
           <a:p>
             <a:pPr lvl="1"/>
             <a:r>
+              <a:rPr lang="en-US" b="1" dirty="0"/>
+              <a:t>mount</a:t>
+            </a:r>
+            <a:r>
               <a:rPr lang="en-US" dirty="0"/>
-              <a:t>mount – </a:t>
+              <a:t> – </a:t>
             </a:r>
             <a:r>
               <a:rPr lang="en-US" dirty="0" err="1"/>
@@ -4156,12 +4803,16 @@
           <a:p>
             <a:pPr lvl="1"/>
             <a:r>
-              <a:rPr lang="en-US" dirty="0" err="1"/>
+              <a:rPr lang="en-US" b="1" dirty="0" err="1"/>
               <a:t>handle_event</a:t>
             </a:r>
             <a:r>
+              <a:rPr lang="en-US" b="1" dirty="0"/>
+              <a:t> </a:t>
+            </a:r>
+            <a:r>
               <a:rPr lang="en-US" dirty="0"/>
-              <a:t> – used for handling user events</a:t>
+              <a:t>– used for handling user events</a:t>
             </a:r>
             <a:endParaRPr lang="bg-BG" dirty="0"/>
           </a:p>
@@ -4181,8 +4832,8 @@
         </p:nvSpPr>
         <p:spPr>
           <a:xfrm>
-            <a:off x="6370320" y="288925"/>
-            <a:ext cx="5675376" cy="5517404"/>
+            <a:off x="6370320" y="475130"/>
+            <a:ext cx="5675376" cy="5144994"/>
           </a:xfrm>
           <a:prstGeom prst="rect">
             <a:avLst/>
@@ -4218,8 +4869,13 @@
           </a:bodyPr>
           <a:lstStyle/>
           <a:p>
-            <a:r>
-              <a:rPr lang="en-US" sz="1600" b="0" dirty="0">
+            <a:pPr>
+              <a:lnSpc>
+                <a:spcPts val="1425"/>
+              </a:lnSpc>
+            </a:pPr>
+            <a:r>
+              <a:rPr lang="en-US" sz="1400" b="0" dirty="0">
                 <a:solidFill>
                   <a:srgbClr val="0000FF"/>
                 </a:solidFill>
@@ -4229,7 +4885,7 @@
               <a:t>defmodule</a:t>
             </a:r>
             <a:r>
-              <a:rPr lang="en-US" sz="1600" b="0" dirty="0">
+              <a:rPr lang="en-US" sz="1400" b="0" dirty="0">
                 <a:solidFill>
                   <a:srgbClr val="000000"/>
                 </a:solidFill>
@@ -4239,17 +4895,17 @@
               <a:t> </a:t>
             </a:r>
             <a:r>
-              <a:rPr lang="en-US" sz="1600" b="0" dirty="0" err="1">
+              <a:rPr lang="en-US" sz="1400" b="0" dirty="0" err="1">
                 <a:solidFill>
                   <a:srgbClr val="000000"/>
                 </a:solidFill>
                 <a:effectLst/>
                 <a:latin typeface="Consolas" panose="020B0609020204030204" pitchFamily="49" charset="0"/>
               </a:rPr>
-              <a:t>MyStoreWeb.Counter</a:t>
-            </a:r>
-            <a:r>
-              <a:rPr lang="en-US" sz="1600" b="0" dirty="0">
+              <a:t>LiveExampleWeb.Components.Counter</a:t>
+            </a:r>
+            <a:r>
+              <a:rPr lang="en-US" sz="1400" b="0" dirty="0">
                 <a:solidFill>
                   <a:srgbClr val="000000"/>
                 </a:solidFill>
@@ -4259,7 +4915,7 @@
               <a:t> </a:t>
             </a:r>
             <a:r>
-              <a:rPr lang="en-US" sz="1600" b="0" dirty="0">
+              <a:rPr lang="en-US" sz="1400" b="0" dirty="0">
                 <a:solidFill>
                   <a:srgbClr val="0000FF"/>
                 </a:solidFill>
@@ -4268,7 +4924,7 @@
               </a:rPr>
               <a:t>do</a:t>
             </a:r>
-            <a:endParaRPr lang="en-US" sz="1600" b="0" dirty="0">
+            <a:endParaRPr lang="en-US" sz="1400" b="0" dirty="0">
               <a:solidFill>
                 <a:srgbClr val="000000"/>
               </a:solidFill>
@@ -4277,8 +4933,13 @@
             </a:endParaRPr>
           </a:p>
           <a:p>
-            <a:r>
-              <a:rPr lang="en-US" sz="1600" b="0" dirty="0">
+            <a:pPr>
+              <a:lnSpc>
+                <a:spcPts val="1425"/>
+              </a:lnSpc>
+            </a:pPr>
+            <a:r>
+              <a:rPr lang="en-US" sz="1400" b="0" dirty="0">
                 <a:solidFill>
                   <a:srgbClr val="000000"/>
                 </a:solidFill>
@@ -4288,7 +4949,7 @@
               <a:t>  </a:t>
             </a:r>
             <a:r>
-              <a:rPr lang="en-US" sz="1600" b="0" dirty="0">
+              <a:rPr lang="en-US" sz="1400" b="0" dirty="0">
                 <a:solidFill>
                   <a:srgbClr val="0000FF"/>
                 </a:solidFill>
@@ -4298,7 +4959,7 @@
               <a:t>use</a:t>
             </a:r>
             <a:r>
-              <a:rPr lang="en-US" sz="1600" b="0" dirty="0">
+              <a:rPr lang="en-US" sz="1400" b="0" dirty="0">
                 <a:solidFill>
                   <a:srgbClr val="000000"/>
                 </a:solidFill>
@@ -4308,16 +4969,46 @@
               <a:t> </a:t>
             </a:r>
             <a:r>
-              <a:rPr lang="en-US" sz="1600" b="0" dirty="0" err="1">
+              <a:rPr lang="en-US" sz="1400" b="0" dirty="0" err="1">
                 <a:solidFill>
                   <a:srgbClr val="000000"/>
                 </a:solidFill>
                 <a:effectLst/>
                 <a:latin typeface="Consolas" panose="020B0609020204030204" pitchFamily="49" charset="0"/>
               </a:rPr>
-              <a:t>Phoenix.LiveView</a:t>
-            </a:r>
-            <a:endParaRPr lang="en-US" sz="1600" b="0" dirty="0">
+              <a:t>LiveExampleWeb</a:t>
+            </a:r>
+            <a:r>
+              <a:rPr lang="en-US" sz="1400" b="0" dirty="0">
+                <a:solidFill>
+                  <a:srgbClr val="000000"/>
+                </a:solidFill>
+                <a:effectLst/>
+                <a:latin typeface="Consolas" panose="020B0609020204030204" pitchFamily="49" charset="0"/>
+              </a:rPr>
+              <a:t>, </a:t>
+            </a:r>
+            <a:r>
+              <a:rPr lang="en-US" sz="1400" b="0" dirty="0">
+                <a:solidFill>
+                  <a:srgbClr val="0000FF"/>
+                </a:solidFill>
+                <a:effectLst/>
+                <a:latin typeface="Consolas" panose="020B0609020204030204" pitchFamily="49" charset="0"/>
+              </a:rPr>
+              <a:t>:</a:t>
+            </a:r>
+            <a:r>
+              <a:rPr lang="en-US" sz="1400" b="0" dirty="0" err="1">
+                <a:solidFill>
+                  <a:srgbClr val="0000FF"/>
+                </a:solidFill>
+                <a:effectLst/>
+                <a:latin typeface="Consolas" panose="020B0609020204030204" pitchFamily="49" charset="0"/>
+              </a:rPr>
+              <a:t>live_view</a:t>
+            </a:r>
+            <a:endParaRPr lang="en-US" sz="1400" b="0" dirty="0">
               <a:solidFill>
                 <a:srgbClr val="000000"/>
               </a:solidFill>
@@ -4326,8 +5017,13 @@
             </a:endParaRPr>
           </a:p>
           <a:p>
+            <a:pPr>
+              <a:lnSpc>
+                <a:spcPts val="1425"/>
+              </a:lnSpc>
+            </a:pPr>
             <a:br>
-              <a:rPr lang="en-US" sz="1600" b="0" dirty="0">
+              <a:rPr lang="en-US" sz="1400" b="0" dirty="0">
                 <a:solidFill>
                   <a:srgbClr val="000000"/>
                 </a:solidFill>
@@ -4336,7 +5032,7 @@
               </a:rPr>
             </a:br>
             <a:r>
-              <a:rPr lang="en-US" sz="1600" b="0" dirty="0">
+              <a:rPr lang="en-US" sz="1400" b="0" dirty="0">
                 <a:solidFill>
                   <a:srgbClr val="000000"/>
                 </a:solidFill>
@@ -4346,7 +5042,7 @@
               <a:t>  </a:t>
             </a:r>
             <a:r>
-              <a:rPr lang="en-US" sz="1600" b="0" dirty="0">
+              <a:rPr lang="en-US" sz="1400" b="0" dirty="0">
                 <a:solidFill>
                   <a:srgbClr val="0000FF"/>
                 </a:solidFill>
@@ -4356,7 +5052,7 @@
               <a:t>def</a:t>
             </a:r>
             <a:r>
-              <a:rPr lang="en-US" sz="1600" b="0" dirty="0">
+              <a:rPr lang="en-US" sz="1400" b="0" dirty="0">
                 <a:solidFill>
                   <a:srgbClr val="000000"/>
                 </a:solidFill>
@@ -4366,7 +5062,7 @@
               <a:t> render(assigns) </a:t>
             </a:r>
             <a:r>
-              <a:rPr lang="en-US" sz="1600" b="0" dirty="0">
+              <a:rPr lang="en-US" sz="1400" b="0" dirty="0">
                 <a:solidFill>
                   <a:srgbClr val="0000FF"/>
                 </a:solidFill>
@@ -4375,7 +5071,7 @@
               </a:rPr>
               <a:t>do</a:t>
             </a:r>
-            <a:endParaRPr lang="en-US" sz="1600" b="0" dirty="0">
+            <a:endParaRPr lang="en-US" sz="1400" b="0" dirty="0">
               <a:solidFill>
                 <a:srgbClr val="000000"/>
               </a:solidFill>
@@ -4384,27 +5080,32 @@
             </a:endParaRPr>
           </a:p>
           <a:p>
-            <a:r>
-              <a:rPr lang="en-US" sz="1600" b="0" dirty="0">
+            <a:pPr>
+              <a:lnSpc>
+                <a:spcPts val="1425"/>
+              </a:lnSpc>
+            </a:pPr>
+            <a:r>
+              <a:rPr lang="en-US" sz="1400" b="0" dirty="0">
                 <a:solidFill>
                   <a:srgbClr val="000000"/>
                 </a:solidFill>
                 <a:effectLst/>
                 <a:latin typeface="Consolas" panose="020B0609020204030204" pitchFamily="49" charset="0"/>
               </a:rPr>
-              <a:t>    </a:t>
-            </a:r>
-            <a:r>
-              <a:rPr lang="en-US" sz="1600" b="0" dirty="0">
+              <a:t>   </a:t>
+            </a:r>
+            <a:r>
+              <a:rPr lang="en-US" sz="1400" b="0" dirty="0">
                 <a:solidFill>
                   <a:srgbClr val="A31515"/>
                 </a:solidFill>
                 <a:effectLst/>
                 <a:latin typeface="Consolas" panose="020B0609020204030204" pitchFamily="49" charset="0"/>
               </a:rPr>
-              <a:t>~H"""</a:t>
-            </a:r>
-            <a:endParaRPr lang="en-US" sz="1600" b="0" dirty="0">
+              <a:t> ~H"""</a:t>
+            </a:r>
+            <a:endParaRPr lang="en-US" sz="1400" b="0" dirty="0">
               <a:solidFill>
                 <a:srgbClr val="000000"/>
               </a:solidFill>
@@ -4413,37 +5114,92 @@
             </a:endParaRPr>
           </a:p>
           <a:p>
-            <a:r>
-              <a:rPr lang="en-US" sz="1600" b="0" dirty="0">
-                <a:solidFill>
-                  <a:srgbClr val="A31515"/>
+            <a:pPr>
+              <a:lnSpc>
+                <a:spcPts val="1425"/>
+              </a:lnSpc>
+            </a:pPr>
+            <a:r>
+              <a:rPr lang="en-US" sz="1400" b="0" dirty="0">
+                <a:solidFill>
+                  <a:srgbClr val="000000"/>
                 </a:solidFill>
                 <a:effectLst/>
                 <a:latin typeface="Consolas" panose="020B0609020204030204" pitchFamily="49" charset="0"/>
               </a:rPr>
-              <a:t>    Current value: &lt;%= @value %&gt; &lt;</a:t>
-            </a:r>
-            <a:r>
-              <a:rPr lang="en-US" sz="1600" b="0" dirty="0" err="1">
-                <a:solidFill>
-                  <a:srgbClr val="A31515"/>
+              <a:t>    Current value: </a:t>
+            </a:r>
+            <a:r>
+              <a:rPr lang="en-US" sz="1400" b="0" dirty="0">
+                <a:solidFill>
+                  <a:srgbClr val="0000FF"/>
                 </a:solidFill>
                 <a:effectLst/>
                 <a:latin typeface="Consolas" panose="020B0609020204030204" pitchFamily="49" charset="0"/>
               </a:rPr>
+              <a:t>&lt;%=</a:t>
+            </a:r>
+            <a:r>
+              <a:rPr lang="en-US" sz="1400" b="0" dirty="0">
+                <a:solidFill>
+                  <a:srgbClr val="000000"/>
+                </a:solidFill>
+                <a:effectLst/>
+                <a:latin typeface="Consolas" panose="020B0609020204030204" pitchFamily="49" charset="0"/>
+              </a:rPr>
+              <a:t> @value </a:t>
+            </a:r>
+            <a:r>
+              <a:rPr lang="en-US" sz="1400" b="0" dirty="0">
+                <a:solidFill>
+                  <a:srgbClr val="0000FF"/>
+                </a:solidFill>
+                <a:effectLst/>
+                <a:latin typeface="Consolas" panose="020B0609020204030204" pitchFamily="49" charset="0"/>
+              </a:rPr>
+              <a:t>%&gt;</a:t>
+            </a:r>
+            <a:r>
+              <a:rPr lang="en-US" sz="1400" b="0" dirty="0">
+                <a:solidFill>
+                  <a:srgbClr val="000000"/>
+                </a:solidFill>
+                <a:effectLst/>
+                <a:latin typeface="Consolas" panose="020B0609020204030204" pitchFamily="49" charset="0"/>
+              </a:rPr>
+              <a:t> </a:t>
+            </a:r>
+            <a:r>
+              <a:rPr lang="en-US" sz="1400" b="0" dirty="0">
+                <a:solidFill>
+                  <a:srgbClr val="800000"/>
+                </a:solidFill>
+                <a:effectLst/>
+                <a:latin typeface="Consolas" panose="020B0609020204030204" pitchFamily="49" charset="0"/>
+              </a:rPr>
+              <a:t>&lt;</a:t>
+            </a:r>
+            <a:r>
+              <a:rPr lang="en-US" sz="1400" b="0" dirty="0" err="1">
+                <a:solidFill>
+                  <a:srgbClr val="800000"/>
+                </a:solidFill>
+                <a:effectLst/>
+                <a:latin typeface="Consolas" panose="020B0609020204030204" pitchFamily="49" charset="0"/>
+              </a:rPr>
               <a:t>br</a:t>
             </a:r>
             <a:r>
-              <a:rPr lang="en-US" sz="1600" b="0" dirty="0">
-                <a:solidFill>
-                  <a:srgbClr val="A31515"/>
+              <a:rPr lang="en-US" sz="1400" b="0" dirty="0">
+                <a:solidFill>
+                  <a:srgbClr val="800000"/>
                 </a:solidFill>
                 <a:effectLst/>
                 <a:latin typeface="Consolas" panose="020B0609020204030204" pitchFamily="49" charset="0"/>
               </a:rPr>
               <a:t> /&gt;</a:t>
             </a:r>
-            <a:endParaRPr lang="en-US" sz="1600" b="0" dirty="0">
+            <a:endParaRPr lang="en-US" sz="1400" b="0" dirty="0">
               <a:solidFill>
                 <a:srgbClr val="000000"/>
               </a:solidFill>
@@ -4452,57 +5208,132 @@
             </a:endParaRPr>
           </a:p>
           <a:p>
-            <a:r>
-              <a:rPr lang="en-US" sz="1600" b="0" dirty="0">
-                <a:solidFill>
-                  <a:srgbClr val="A31515"/>
+            <a:pPr>
+              <a:lnSpc>
+                <a:spcPts val="1425"/>
+              </a:lnSpc>
+            </a:pPr>
+            <a:r>
+              <a:rPr lang="en-US" sz="1400" b="0" dirty="0">
+                <a:solidFill>
+                  <a:srgbClr val="000000"/>
                 </a:solidFill>
                 <a:effectLst/>
                 <a:latin typeface="Consolas" panose="020B0609020204030204" pitchFamily="49" charset="0"/>
               </a:rPr>
-              <a:t>    &lt;button </a:t>
-            </a:r>
-            <a:r>
-              <a:rPr lang="en-US" sz="1600" b="0" dirty="0" err="1">
-                <a:solidFill>
-                  <a:srgbClr val="A31515"/>
+              <a:t>    </a:t>
+            </a:r>
+            <a:r>
+              <a:rPr lang="en-US" sz="1400" b="0" dirty="0">
+                <a:solidFill>
+                  <a:srgbClr val="800000"/>
                 </a:solidFill>
                 <a:effectLst/>
                 <a:latin typeface="Consolas" panose="020B0609020204030204" pitchFamily="49" charset="0"/>
               </a:rPr>
+              <a:t>&lt;button</a:t>
+            </a:r>
+            <a:r>
+              <a:rPr lang="en-US" sz="1400" b="0" dirty="0">
+                <a:solidFill>
+                  <a:srgbClr val="000000"/>
+                </a:solidFill>
+                <a:effectLst/>
+                <a:latin typeface="Consolas" panose="020B0609020204030204" pitchFamily="49" charset="0"/>
+              </a:rPr>
+              <a:t> </a:t>
+            </a:r>
+            <a:r>
+              <a:rPr lang="en-US" sz="1400" b="0" dirty="0" err="1">
+                <a:solidFill>
+                  <a:srgbClr val="E50000"/>
+                </a:solidFill>
+                <a:effectLst/>
+                <a:latin typeface="Consolas" panose="020B0609020204030204" pitchFamily="49" charset="0"/>
+              </a:rPr>
               <a:t>phx</a:t>
             </a:r>
             <a:r>
-              <a:rPr lang="en-US" sz="1600" b="0" dirty="0">
-                <a:solidFill>
-                  <a:srgbClr val="A31515"/>
+              <a:rPr lang="en-US" sz="1400" b="0" dirty="0">
+                <a:solidFill>
+                  <a:srgbClr val="E50000"/>
                 </a:solidFill>
                 <a:effectLst/>
                 <a:latin typeface="Consolas" panose="020B0609020204030204" pitchFamily="49" charset="0"/>
               </a:rPr>
-              <a:t>-click="</a:t>
-            </a:r>
-            <a:r>
-              <a:rPr lang="en-US" sz="1600" b="0" dirty="0" err="1">
-                <a:solidFill>
-                  <a:srgbClr val="A31515"/>
+              <a:t>-click</a:t>
+            </a:r>
+            <a:r>
+              <a:rPr lang="en-US" sz="1400" b="0" dirty="0">
+                <a:solidFill>
+                  <a:srgbClr val="000000"/>
                 </a:solidFill>
                 <a:effectLst/>
                 <a:latin typeface="Consolas" panose="020B0609020204030204" pitchFamily="49" charset="0"/>
               </a:rPr>
+              <a:t>=</a:t>
+            </a:r>
+            <a:r>
+              <a:rPr lang="en-US" sz="1400" b="0" dirty="0">
+                <a:solidFill>
+                  <a:srgbClr val="0000FF"/>
+                </a:solidFill>
+                <a:effectLst/>
+                <a:latin typeface="Consolas" panose="020B0609020204030204" pitchFamily="49" charset="0"/>
+              </a:rPr>
+              <a:t>"</a:t>
+            </a:r>
+            <a:r>
+              <a:rPr lang="en-US" sz="1400" b="0" dirty="0" err="1">
+                <a:solidFill>
+                  <a:srgbClr val="0000FF"/>
+                </a:solidFill>
+                <a:effectLst/>
+                <a:latin typeface="Consolas" panose="020B0609020204030204" pitchFamily="49" charset="0"/>
+              </a:rPr>
               <a:t>inc_value</a:t>
             </a:r>
             <a:r>
-              <a:rPr lang="en-US" sz="1600" b="0" dirty="0">
-                <a:solidFill>
-                  <a:srgbClr val="A31515"/>
+              <a:rPr lang="en-US" sz="1400" b="0" dirty="0">
+                <a:solidFill>
+                  <a:srgbClr val="0000FF"/>
                 </a:solidFill>
                 <a:effectLst/>
                 <a:latin typeface="Consolas" panose="020B0609020204030204" pitchFamily="49" charset="0"/>
               </a:rPr>
-              <a:t>"&gt;+&lt;/button&gt;</a:t>
-            </a:r>
-            <a:endParaRPr lang="en-US" sz="1600" b="0" dirty="0">
+              <a:t>"</a:t>
+            </a:r>
+            <a:r>
+              <a:rPr lang="en-US" sz="1400" b="0" dirty="0">
+                <a:solidFill>
+                  <a:srgbClr val="800000"/>
+                </a:solidFill>
+                <a:effectLst/>
+                <a:latin typeface="Consolas" panose="020B0609020204030204" pitchFamily="49" charset="0"/>
+              </a:rPr>
+              <a:t>&gt;</a:t>
+            </a:r>
+            <a:r>
+              <a:rPr lang="en-US" sz="1400" b="0" dirty="0">
+                <a:solidFill>
+                  <a:srgbClr val="000000"/>
+                </a:solidFill>
+                <a:effectLst/>
+                <a:latin typeface="Consolas" panose="020B0609020204030204" pitchFamily="49" charset="0"/>
+              </a:rPr>
+              <a:t>+</a:t>
+            </a:r>
+            <a:r>
+              <a:rPr lang="en-US" sz="1400" b="0" dirty="0">
+                <a:solidFill>
+                  <a:srgbClr val="800000"/>
+                </a:solidFill>
+                <a:effectLst/>
+                <a:latin typeface="Consolas" panose="020B0609020204030204" pitchFamily="49" charset="0"/>
+              </a:rPr>
+              <a:t>&lt;/button&gt;</a:t>
+            </a:r>
+            <a:endParaRPr lang="en-US" sz="1400" b="0" dirty="0">
               <a:solidFill>
                 <a:srgbClr val="000000"/>
               </a:solidFill>
@@ -4511,8 +5342,13 @@
             </a:endParaRPr>
           </a:p>
           <a:p>
-            <a:r>
-              <a:rPr lang="en-US" sz="1600" b="0" dirty="0">
+            <a:pPr>
+              <a:lnSpc>
+                <a:spcPts val="1425"/>
+              </a:lnSpc>
+            </a:pPr>
+            <a:r>
+              <a:rPr lang="en-US" sz="1400" b="0" dirty="0">
                 <a:solidFill>
                   <a:srgbClr val="A31515"/>
                 </a:solidFill>
@@ -4521,7 +5357,7 @@
               </a:rPr>
               <a:t>    """</a:t>
             </a:r>
-            <a:endParaRPr lang="en-US" sz="1600" b="0" dirty="0">
+            <a:endParaRPr lang="en-US" sz="1400" b="0" dirty="0">
               <a:solidFill>
                 <a:srgbClr val="000000"/>
               </a:solidFill>
@@ -4530,8 +5366,13 @@
             </a:endParaRPr>
           </a:p>
           <a:p>
-            <a:r>
-              <a:rPr lang="en-US" sz="1600" b="0" dirty="0">
+            <a:pPr>
+              <a:lnSpc>
+                <a:spcPts val="1425"/>
+              </a:lnSpc>
+            </a:pPr>
+            <a:r>
+              <a:rPr lang="en-US" sz="1400" b="0" dirty="0">
                 <a:solidFill>
                   <a:srgbClr val="000000"/>
                 </a:solidFill>
@@ -4541,7 +5382,7 @@
               <a:t>  </a:t>
             </a:r>
             <a:r>
-              <a:rPr lang="en-US" sz="1600" b="0" dirty="0">
+              <a:rPr lang="en-US" sz="1400" b="0" dirty="0">
                 <a:solidFill>
                   <a:srgbClr val="0000FF"/>
                 </a:solidFill>
@@ -4550,7 +5391,7 @@
               </a:rPr>
               <a:t>end</a:t>
             </a:r>
-            <a:endParaRPr lang="en-US" sz="1600" b="0" dirty="0">
+            <a:endParaRPr lang="en-US" sz="1400" b="0" dirty="0">
               <a:solidFill>
                 <a:srgbClr val="000000"/>
               </a:solidFill>
@@ -4559,8 +5400,13 @@
             </a:endParaRPr>
           </a:p>
           <a:p>
+            <a:pPr>
+              <a:lnSpc>
+                <a:spcPts val="1425"/>
+              </a:lnSpc>
+            </a:pPr>
             <a:br>
-              <a:rPr lang="en-US" sz="1600" b="0" dirty="0">
+              <a:rPr lang="en-US" sz="1400" b="0" dirty="0">
                 <a:solidFill>
                   <a:srgbClr val="000000"/>
                 </a:solidFill>
@@ -4569,7 +5415,7 @@
               </a:rPr>
             </a:br>
             <a:r>
-              <a:rPr lang="en-US" sz="1600" b="0" dirty="0">
+              <a:rPr lang="en-US" sz="1400" b="0" dirty="0">
                 <a:solidFill>
                   <a:srgbClr val="000000"/>
                 </a:solidFill>
@@ -4579,7 +5425,7 @@
               <a:t>  </a:t>
             </a:r>
             <a:r>
-              <a:rPr lang="en-US" sz="1600" b="0" dirty="0">
+              <a:rPr lang="en-US" sz="1400" b="0" dirty="0">
                 <a:solidFill>
                   <a:srgbClr val="0000FF"/>
                 </a:solidFill>
@@ -4589,7 +5435,7 @@
               <a:t>def</a:t>
             </a:r>
             <a:r>
-              <a:rPr lang="en-US" sz="1600" b="0" dirty="0">
+              <a:rPr lang="en-US" sz="1400" b="0" dirty="0">
                 <a:solidFill>
                   <a:srgbClr val="000000"/>
                 </a:solidFill>
@@ -4599,7 +5445,7 @@
               <a:t> mount(</a:t>
             </a:r>
             <a:r>
-              <a:rPr lang="en-US" sz="1600" b="0" dirty="0">
+              <a:rPr lang="en-US" sz="1400" b="0" dirty="0">
                 <a:solidFill>
                   <a:srgbClr val="008000"/>
                 </a:solidFill>
@@ -4609,7 +5455,7 @@
               <a:t>_params</a:t>
             </a:r>
             <a:r>
-              <a:rPr lang="en-US" sz="1600" b="0" dirty="0">
+              <a:rPr lang="en-US" sz="1400" b="0" dirty="0">
                 <a:solidFill>
                   <a:srgbClr val="000000"/>
                 </a:solidFill>
@@ -4619,7 +5465,7 @@
               <a:t>, </a:t>
             </a:r>
             <a:r>
-              <a:rPr lang="en-US" sz="1600" b="0" dirty="0">
+              <a:rPr lang="en-US" sz="1400" b="0" dirty="0">
                 <a:solidFill>
                   <a:srgbClr val="008000"/>
                 </a:solidFill>
@@ -4629,7 +5475,7 @@
               <a:t>_session</a:t>
             </a:r>
             <a:r>
-              <a:rPr lang="en-US" sz="1600" b="0" dirty="0">
+              <a:rPr lang="en-US" sz="1400" b="0" dirty="0">
                 <a:solidFill>
                   <a:srgbClr val="000000"/>
                 </a:solidFill>
@@ -4639,7 +5485,7 @@
               <a:t>, socket) </a:t>
             </a:r>
             <a:r>
-              <a:rPr lang="en-US" sz="1600" b="0" dirty="0">
+              <a:rPr lang="en-US" sz="1400" b="0" dirty="0">
                 <a:solidFill>
                   <a:srgbClr val="0000FF"/>
                 </a:solidFill>
@@ -4648,7 +5494,7 @@
               </a:rPr>
               <a:t>do</a:t>
             </a:r>
-            <a:endParaRPr lang="en-US" sz="1600" b="0" dirty="0">
+            <a:endParaRPr lang="en-US" sz="1400" b="0" dirty="0">
               <a:solidFill>
                 <a:srgbClr val="000000"/>
               </a:solidFill>
@@ -4657,8 +5503,13 @@
             </a:endParaRPr>
           </a:p>
           <a:p>
-            <a:r>
-              <a:rPr lang="en-US" sz="1600" b="0" dirty="0">
+            <a:pPr>
+              <a:lnSpc>
+                <a:spcPts val="1425"/>
+              </a:lnSpc>
+            </a:pPr>
+            <a:r>
+              <a:rPr lang="en-US" sz="1400" b="0" dirty="0">
                 <a:solidFill>
                   <a:srgbClr val="000000"/>
                 </a:solidFill>
@@ -4668,7 +5519,7 @@
               <a:t>    {</a:t>
             </a:r>
             <a:r>
-              <a:rPr lang="en-US" sz="1600" b="0" dirty="0">
+              <a:rPr lang="en-US" sz="1400" b="0" dirty="0">
                 <a:solidFill>
                   <a:srgbClr val="0000FF"/>
                 </a:solidFill>
@@ -4678,7 +5529,7 @@
               <a:t>:ok</a:t>
             </a:r>
             <a:r>
-              <a:rPr lang="en-US" sz="1600" b="0" dirty="0">
+              <a:rPr lang="en-US" sz="1400" b="0" dirty="0">
                 <a:solidFill>
                   <a:srgbClr val="000000"/>
                 </a:solidFill>
@@ -4688,7 +5539,7 @@
               <a:t>, assign(socket, </a:t>
             </a:r>
             <a:r>
-              <a:rPr lang="en-US" sz="1600" b="0" dirty="0">
+              <a:rPr lang="en-US" sz="1400" b="0" dirty="0">
                 <a:solidFill>
                   <a:srgbClr val="0000FF"/>
                 </a:solidFill>
@@ -4698,29 +5549,54 @@
               <a:t>:value</a:t>
             </a:r>
             <a:r>
-              <a:rPr lang="en-US" sz="1600" b="0" dirty="0">
+              <a:rPr lang="en-US" sz="1400" b="0" dirty="0">
                 <a:solidFill>
                   <a:srgbClr val="000000"/>
                 </a:solidFill>
                 <a:effectLst/>
                 <a:latin typeface="Consolas" panose="020B0609020204030204" pitchFamily="49" charset="0"/>
               </a:rPr>
-              <a:t>, 20)}</a:t>
-            </a:r>
-          </a:p>
-          <a:p>
-            <a:r>
-              <a:rPr lang="en-US" sz="1600" b="0" dirty="0">
+              <a:t>, </a:t>
+            </a:r>
+            <a:r>
+              <a:rPr lang="en-US" sz="1400" b="0" dirty="0">
+                <a:solidFill>
+                  <a:srgbClr val="098658"/>
+                </a:solidFill>
+                <a:effectLst/>
+                <a:latin typeface="Consolas" panose="020B0609020204030204" pitchFamily="49" charset="0"/>
+              </a:rPr>
+              <a:t>20</a:t>
+            </a:r>
+            <a:r>
+              <a:rPr lang="en-US" sz="1400" b="0" dirty="0">
                 <a:solidFill>
                   <a:srgbClr val="000000"/>
                 </a:solidFill>
                 <a:effectLst/>
                 <a:latin typeface="Consolas" panose="020B0609020204030204" pitchFamily="49" charset="0"/>
               </a:rPr>
+              <a:t>)}</a:t>
+            </a:r>
+          </a:p>
+          <a:p>
+            <a:pPr>
+              <a:lnSpc>
+                <a:spcPts val="1425"/>
+              </a:lnSpc>
+            </a:pPr>
+            <a:r>
+              <a:rPr lang="en-US" sz="1400" b="0" dirty="0">
+                <a:solidFill>
+                  <a:srgbClr val="000000"/>
+                </a:solidFill>
+                <a:effectLst/>
+                <a:latin typeface="Consolas" panose="020B0609020204030204" pitchFamily="49" charset="0"/>
+              </a:rPr>
               <a:t>  </a:t>
             </a:r>
             <a:r>
-              <a:rPr lang="en-US" sz="1600" b="0" dirty="0">
+              <a:rPr lang="en-US" sz="1400" b="0" dirty="0">
                 <a:solidFill>
                   <a:srgbClr val="0000FF"/>
                 </a:solidFill>
@@ -4729,145 +5605,7 @@
               </a:rPr>
               <a:t>end</a:t>
             </a:r>
-            <a:br>
-              <a:rPr lang="en-US" sz="1600" b="0" dirty="0">
-                <a:solidFill>
-                  <a:srgbClr val="000000"/>
-                </a:solidFill>
-                <a:effectLst/>
-                <a:latin typeface="Consolas" panose="020B0609020204030204" pitchFamily="49" charset="0"/>
-              </a:rPr>
-            </a:br>
-            <a:br>
-              <a:rPr lang="en-US" sz="1600" b="0" dirty="0">
-                <a:solidFill>
-                  <a:srgbClr val="000000"/>
-                </a:solidFill>
-                <a:effectLst/>
-                <a:latin typeface="Consolas" panose="020B0609020204030204" pitchFamily="49" charset="0"/>
-              </a:rPr>
-            </a:br>
-            <a:r>
-              <a:rPr lang="en-US" sz="1600" b="0" dirty="0">
-                <a:solidFill>
-                  <a:srgbClr val="000000"/>
-                </a:solidFill>
-                <a:effectLst/>
-                <a:latin typeface="Consolas" panose="020B0609020204030204" pitchFamily="49" charset="0"/>
-              </a:rPr>
-              <a:t>  </a:t>
-            </a:r>
-            <a:r>
-              <a:rPr lang="en-US" sz="1600" b="0" dirty="0">
-                <a:solidFill>
-                  <a:srgbClr val="0000FF"/>
-                </a:solidFill>
-                <a:effectLst/>
-                <a:latin typeface="Consolas" panose="020B0609020204030204" pitchFamily="49" charset="0"/>
-              </a:rPr>
-              <a:t>def</a:t>
-            </a:r>
-            <a:r>
-              <a:rPr lang="en-US" sz="1600" b="0" dirty="0">
-                <a:solidFill>
-                  <a:srgbClr val="000000"/>
-                </a:solidFill>
-                <a:effectLst/>
-                <a:latin typeface="Consolas" panose="020B0609020204030204" pitchFamily="49" charset="0"/>
-              </a:rPr>
-              <a:t> </a:t>
-            </a:r>
-            <a:r>
-              <a:rPr lang="en-US" sz="1600" b="0" dirty="0" err="1">
-                <a:solidFill>
-                  <a:srgbClr val="000000"/>
-                </a:solidFill>
-                <a:effectLst/>
-                <a:latin typeface="Consolas" panose="020B0609020204030204" pitchFamily="49" charset="0"/>
-              </a:rPr>
-              <a:t>handle_event</a:t>
-            </a:r>
-            <a:r>
-              <a:rPr lang="en-US" sz="1600" b="0" dirty="0">
-                <a:solidFill>
-                  <a:srgbClr val="000000"/>
-                </a:solidFill>
-                <a:effectLst/>
-                <a:latin typeface="Consolas" panose="020B0609020204030204" pitchFamily="49" charset="0"/>
-              </a:rPr>
-              <a:t>(</a:t>
-            </a:r>
-            <a:r>
-              <a:rPr lang="en-US" sz="1600" b="0" dirty="0">
-                <a:solidFill>
-                  <a:srgbClr val="A31515"/>
-                </a:solidFill>
-                <a:effectLst/>
-                <a:latin typeface="Consolas" panose="020B0609020204030204" pitchFamily="49" charset="0"/>
-              </a:rPr>
-              <a:t>"</a:t>
-            </a:r>
-            <a:r>
-              <a:rPr lang="en-US" sz="1600" b="0" dirty="0" err="1">
-                <a:solidFill>
-                  <a:srgbClr val="A31515"/>
-                </a:solidFill>
-                <a:effectLst/>
-                <a:latin typeface="Consolas" panose="020B0609020204030204" pitchFamily="49" charset="0"/>
-              </a:rPr>
-              <a:t>inc_value</a:t>
-            </a:r>
-            <a:r>
-              <a:rPr lang="en-US" sz="1600" b="0" dirty="0">
-                <a:solidFill>
-                  <a:srgbClr val="A31515"/>
-                </a:solidFill>
-                <a:effectLst/>
-                <a:latin typeface="Consolas" panose="020B0609020204030204" pitchFamily="49" charset="0"/>
-              </a:rPr>
-              <a:t>"</a:t>
-            </a:r>
-            <a:r>
-              <a:rPr lang="en-US" sz="1600" b="0" dirty="0">
-                <a:solidFill>
-                  <a:srgbClr val="000000"/>
-                </a:solidFill>
-                <a:effectLst/>
-                <a:latin typeface="Consolas" panose="020B0609020204030204" pitchFamily="49" charset="0"/>
-              </a:rPr>
-              <a:t>, </a:t>
-            </a:r>
-            <a:r>
-              <a:rPr lang="en-US" sz="1600" b="0" dirty="0">
-                <a:solidFill>
-                  <a:srgbClr val="008000"/>
-                </a:solidFill>
-                <a:effectLst/>
-                <a:latin typeface="Consolas" panose="020B0609020204030204" pitchFamily="49" charset="0"/>
-              </a:rPr>
-              <a:t>params</a:t>
-            </a:r>
-            <a:r>
-              <a:rPr lang="en-US" sz="1600" b="0" dirty="0">
-                <a:solidFill>
-                  <a:srgbClr val="000000"/>
-                </a:solidFill>
-                <a:effectLst/>
-                <a:latin typeface="Consolas" panose="020B0609020204030204" pitchFamily="49" charset="0"/>
-              </a:rPr>
-              <a:t>, socket) </a:t>
-            </a:r>
-            <a:r>
-              <a:rPr lang="en-US" sz="1600" b="0" dirty="0">
-                <a:solidFill>
-                  <a:srgbClr val="0000FF"/>
-                </a:solidFill>
-                <a:effectLst/>
-                <a:latin typeface="Consolas" panose="020B0609020204030204" pitchFamily="49" charset="0"/>
-              </a:rPr>
-              <a:t>do</a:t>
-            </a:r>
-            <a:endParaRPr lang="en-US" sz="1600" b="0" dirty="0">
+            <a:endParaRPr lang="en-US" sz="1400" b="0" dirty="0">
               <a:solidFill>
                 <a:srgbClr val="000000"/>
               </a:solidFill>
@@ -4876,109 +5614,121 @@
             </a:endParaRPr>
           </a:p>
           <a:p>
-            <a:r>
-              <a:rPr lang="en-US" sz="1600" b="0" dirty="0">
+            <a:pPr>
+              <a:lnSpc>
+                <a:spcPts val="1425"/>
+              </a:lnSpc>
+            </a:pPr>
+            <a:br>
+              <a:rPr lang="en-US" sz="1400" b="0" dirty="0">
                 <a:solidFill>
                   <a:srgbClr val="000000"/>
                 </a:solidFill>
                 <a:effectLst/>
                 <a:latin typeface="Consolas" panose="020B0609020204030204" pitchFamily="49" charset="0"/>
               </a:rPr>
-              <a:t>    {</a:t>
-            </a:r>
-            <a:r>
-              <a:rPr lang="en-US" sz="1600" b="0" dirty="0">
+            </a:br>
+            <a:r>
+              <a:rPr lang="en-US" sz="1400" b="0" dirty="0">
+                <a:solidFill>
+                  <a:srgbClr val="000000"/>
+                </a:solidFill>
+                <a:effectLst/>
+                <a:latin typeface="Consolas" panose="020B0609020204030204" pitchFamily="49" charset="0"/>
+              </a:rPr>
+              <a:t>  </a:t>
+            </a:r>
+            <a:r>
+              <a:rPr lang="en-US" sz="1400" b="0" dirty="0">
                 <a:solidFill>
                   <a:srgbClr val="0000FF"/>
                 </a:solidFill>
                 <a:effectLst/>
                 <a:latin typeface="Consolas" panose="020B0609020204030204" pitchFamily="49" charset="0"/>
               </a:rPr>
-              <a:t>:</a:t>
-            </a:r>
-            <a:r>
-              <a:rPr lang="en-US" sz="1600" b="0" dirty="0" err="1">
+              <a:t>def</a:t>
+            </a:r>
+            <a:r>
+              <a:rPr lang="en-US" sz="1400" b="0" dirty="0">
+                <a:solidFill>
+                  <a:srgbClr val="000000"/>
+                </a:solidFill>
+                <a:effectLst/>
+                <a:latin typeface="Consolas" panose="020B0609020204030204" pitchFamily="49" charset="0"/>
+              </a:rPr>
+              <a:t> </a:t>
+            </a:r>
+            <a:r>
+              <a:rPr lang="en-US" sz="1400" b="0" dirty="0" err="1">
+                <a:solidFill>
+                  <a:srgbClr val="000000"/>
+                </a:solidFill>
+                <a:effectLst/>
+                <a:latin typeface="Consolas" panose="020B0609020204030204" pitchFamily="49" charset="0"/>
+              </a:rPr>
+              <a:t>handle_event</a:t>
+            </a:r>
+            <a:r>
+              <a:rPr lang="en-US" sz="1400" b="0" dirty="0">
+                <a:solidFill>
+                  <a:srgbClr val="000000"/>
+                </a:solidFill>
+                <a:effectLst/>
+                <a:latin typeface="Consolas" panose="020B0609020204030204" pitchFamily="49" charset="0"/>
+              </a:rPr>
+              <a:t>(</a:t>
+            </a:r>
+            <a:r>
+              <a:rPr lang="en-US" sz="1400" b="0" dirty="0">
+                <a:solidFill>
+                  <a:srgbClr val="A31515"/>
+                </a:solidFill>
+                <a:effectLst/>
+                <a:latin typeface="Consolas" panose="020B0609020204030204" pitchFamily="49" charset="0"/>
+              </a:rPr>
+              <a:t>"</a:t>
+            </a:r>
+            <a:r>
+              <a:rPr lang="en-US" sz="1400" b="0" dirty="0" err="1">
+                <a:solidFill>
+                  <a:srgbClr val="A31515"/>
+                </a:solidFill>
+                <a:effectLst/>
+                <a:latin typeface="Consolas" panose="020B0609020204030204" pitchFamily="49" charset="0"/>
+              </a:rPr>
+              <a:t>inc_value</a:t>
+            </a:r>
+            <a:r>
+              <a:rPr lang="en-US" sz="1400" b="0" dirty="0">
+                <a:solidFill>
+                  <a:srgbClr val="A31515"/>
+                </a:solidFill>
+                <a:effectLst/>
+                <a:latin typeface="Consolas" panose="020B0609020204030204" pitchFamily="49" charset="0"/>
+              </a:rPr>
+              <a:t>"</a:t>
+            </a:r>
+            <a:r>
+              <a:rPr lang="en-US" sz="1400" b="0" dirty="0">
+                <a:solidFill>
+                  <a:srgbClr val="000000"/>
+                </a:solidFill>
+                <a:effectLst/>
+                <a:latin typeface="Consolas" panose="020B0609020204030204" pitchFamily="49" charset="0"/>
+              </a:rPr>
+              <a:t>, params, socket) </a:t>
+            </a:r>
+            <a:r>
+              <a:rPr lang="en-US" sz="1400" b="0" dirty="0">
                 <a:solidFill>
                   <a:srgbClr val="0000FF"/>
                 </a:solidFill>
                 <a:effectLst/>
                 <a:latin typeface="Consolas" panose="020B0609020204030204" pitchFamily="49" charset="0"/>
               </a:rPr>
-              <a:t>noreply</a:t>
-            </a:r>
-            <a:r>
-              <a:rPr lang="en-US" sz="1600" b="0" dirty="0">
-                <a:solidFill>
-                  <a:srgbClr val="000000"/>
-                </a:solidFill>
-                <a:effectLst/>
-                <a:latin typeface="Consolas" panose="020B0609020204030204" pitchFamily="49" charset="0"/>
-              </a:rPr>
-              <a:t>, update(socket, </a:t>
-            </a:r>
-            <a:r>
-              <a:rPr lang="en-US" sz="1600" b="0" dirty="0">
-                <a:solidFill>
-                  <a:srgbClr val="0000FF"/>
-                </a:solidFill>
-                <a:effectLst/>
-                <a:latin typeface="Consolas" panose="020B0609020204030204" pitchFamily="49" charset="0"/>
-              </a:rPr>
-              <a:t>:value</a:t>
-            </a:r>
-            <a:r>
-              <a:rPr lang="en-US" sz="1600" b="0" dirty="0">
-                <a:solidFill>
-                  <a:srgbClr val="000000"/>
-                </a:solidFill>
-                <a:effectLst/>
-                <a:latin typeface="Consolas" panose="020B0609020204030204" pitchFamily="49" charset="0"/>
-              </a:rPr>
-              <a:t>, </a:t>
-            </a:r>
-            <a:r>
-              <a:rPr lang="en-US" sz="1600" b="0" dirty="0" err="1">
-                <a:solidFill>
-                  <a:srgbClr val="0000FF"/>
-                </a:solidFill>
-                <a:effectLst/>
-                <a:latin typeface="Consolas" panose="020B0609020204030204" pitchFamily="49" charset="0"/>
-              </a:rPr>
-              <a:t>fn</a:t>
-            </a:r>
-            <a:r>
-              <a:rPr lang="en-US" sz="1600" b="0" dirty="0">
-                <a:solidFill>
-                  <a:srgbClr val="000000"/>
-                </a:solidFill>
-                <a:effectLst/>
-                <a:latin typeface="Consolas" panose="020B0609020204030204" pitchFamily="49" charset="0"/>
-              </a:rPr>
-              <a:t> x -&gt; …}</a:t>
-            </a:r>
-          </a:p>
-          <a:p>
-            <a:r>
-              <a:rPr lang="en-US" sz="1600" b="0" dirty="0">
-                <a:solidFill>
-                  <a:srgbClr val="000000"/>
-                </a:solidFill>
-                <a:effectLst/>
-                <a:latin typeface="Consolas" panose="020B0609020204030204" pitchFamily="49" charset="0"/>
-              </a:rPr>
-              <a:t>  </a:t>
-            </a:r>
-            <a:r>
-              <a:rPr lang="en-US" sz="1600" b="0" dirty="0">
-                <a:solidFill>
-                  <a:srgbClr val="0000FF"/>
-                </a:solidFill>
-                <a:effectLst/>
-                <a:latin typeface="Consolas" panose="020B0609020204030204" pitchFamily="49" charset="0"/>
-              </a:rPr>
-              <a:t>end</a:t>
-            </a:r>
-            <a:endParaRPr lang="en-US" sz="1600" b="0" dirty="0">
+              <a:t>do</a:t>
+            </a:r>
+            <a:endParaRPr lang="en-US" sz="1400" b="0" dirty="0">
               <a:solidFill>
                 <a:srgbClr val="000000"/>
               </a:solidFill>
@@ -4987,17 +5737,216 @@
             </a:endParaRPr>
           </a:p>
           <a:p>
-            <a:r>
-              <a:rPr lang="en-US" sz="1600" b="0" dirty="0">
+            <a:pPr>
+              <a:lnSpc>
+                <a:spcPts val="1425"/>
+              </a:lnSpc>
+            </a:pPr>
+            <a:r>
+              <a:rPr lang="en-US" sz="1400" b="0" dirty="0">
+                <a:solidFill>
+                  <a:srgbClr val="000000"/>
+                </a:solidFill>
+                <a:effectLst/>
+                <a:latin typeface="Consolas" panose="020B0609020204030204" pitchFamily="49" charset="0"/>
+              </a:rPr>
+              <a:t>    {</a:t>
+            </a:r>
+            <a:r>
+              <a:rPr lang="en-US" sz="1400" b="0" dirty="0">
                 <a:solidFill>
                   <a:srgbClr val="0000FF"/>
                 </a:solidFill>
                 <a:effectLst/>
                 <a:latin typeface="Consolas" panose="020B0609020204030204" pitchFamily="49" charset="0"/>
               </a:rPr>
+              <a:t>:</a:t>
+            </a:r>
+            <a:r>
+              <a:rPr lang="en-US" sz="1400" b="0" dirty="0" err="1">
+                <a:solidFill>
+                  <a:srgbClr val="0000FF"/>
+                </a:solidFill>
+                <a:effectLst/>
+                <a:latin typeface="Consolas" panose="020B0609020204030204" pitchFamily="49" charset="0"/>
+              </a:rPr>
+              <a:t>noreply</a:t>
+            </a:r>
+            <a:r>
+              <a:rPr lang="en-US" sz="1400" b="0" dirty="0">
+                <a:solidFill>
+                  <a:srgbClr val="000000"/>
+                </a:solidFill>
+                <a:effectLst/>
+                <a:latin typeface="Consolas" panose="020B0609020204030204" pitchFamily="49" charset="0"/>
+              </a:rPr>
+              <a:t>, </a:t>
+            </a:r>
+            <a:endParaRPr lang="bg-BG" sz="1400" b="0" dirty="0">
+              <a:solidFill>
+                <a:srgbClr val="000000"/>
+              </a:solidFill>
+              <a:effectLst/>
+              <a:latin typeface="Consolas" panose="020B0609020204030204" pitchFamily="49" charset="0"/>
+            </a:endParaRPr>
+          </a:p>
+          <a:p>
+            <a:pPr>
+              <a:lnSpc>
+                <a:spcPts val="1425"/>
+              </a:lnSpc>
+            </a:pPr>
+            <a:r>
+              <a:rPr lang="bg-BG" sz="1400" dirty="0">
+                <a:solidFill>
+                  <a:srgbClr val="000000"/>
+                </a:solidFill>
+                <a:latin typeface="Consolas" panose="020B0609020204030204" pitchFamily="49" charset="0"/>
+              </a:rPr>
+              <a:t>     </a:t>
+            </a:r>
+            <a:r>
+              <a:rPr lang="en-US" sz="1400" b="0" dirty="0">
+                <a:solidFill>
+                  <a:srgbClr val="000000"/>
+                </a:solidFill>
+                <a:effectLst/>
+                <a:latin typeface="Consolas" panose="020B0609020204030204" pitchFamily="49" charset="0"/>
+              </a:rPr>
+              <a:t>update(socket, </a:t>
+            </a:r>
+            <a:r>
+              <a:rPr lang="en-US" sz="1400" b="0" dirty="0">
+                <a:solidFill>
+                  <a:srgbClr val="0000FF"/>
+                </a:solidFill>
+                <a:effectLst/>
+                <a:latin typeface="Consolas" panose="020B0609020204030204" pitchFamily="49" charset="0"/>
+              </a:rPr>
+              <a:t>:value</a:t>
+            </a:r>
+            <a:r>
+              <a:rPr lang="en-US" sz="1400" b="0" dirty="0">
+                <a:solidFill>
+                  <a:srgbClr val="000000"/>
+                </a:solidFill>
+                <a:effectLst/>
+                <a:latin typeface="Consolas" panose="020B0609020204030204" pitchFamily="49" charset="0"/>
+              </a:rPr>
+              <a:t>, </a:t>
+            </a:r>
+            <a:r>
+              <a:rPr lang="en-US" sz="1400" b="0" dirty="0" err="1">
+                <a:solidFill>
+                  <a:srgbClr val="0000FF"/>
+                </a:solidFill>
+                <a:effectLst/>
+                <a:latin typeface="Consolas" panose="020B0609020204030204" pitchFamily="49" charset="0"/>
+              </a:rPr>
+              <a:t>fn</a:t>
+            </a:r>
+            <a:r>
+              <a:rPr lang="en-US" sz="1400" b="0" dirty="0">
+                <a:solidFill>
+                  <a:srgbClr val="000000"/>
+                </a:solidFill>
+                <a:effectLst/>
+                <a:latin typeface="Consolas" panose="020B0609020204030204" pitchFamily="49" charset="0"/>
+              </a:rPr>
+              <a:t> x -&gt; x + </a:t>
+            </a:r>
+            <a:r>
+              <a:rPr lang="en-US" sz="1400" b="0" dirty="0">
+                <a:solidFill>
+                  <a:srgbClr val="098658"/>
+                </a:solidFill>
+                <a:effectLst/>
+                <a:latin typeface="Consolas" panose="020B0609020204030204" pitchFamily="49" charset="0"/>
+              </a:rPr>
+              <a:t>1</a:t>
+            </a:r>
+            <a:r>
+              <a:rPr lang="en-US" sz="1400" b="0" dirty="0">
+                <a:solidFill>
+                  <a:srgbClr val="000000"/>
+                </a:solidFill>
+                <a:effectLst/>
+                <a:latin typeface="Consolas" panose="020B0609020204030204" pitchFamily="49" charset="0"/>
+              </a:rPr>
+              <a:t> </a:t>
+            </a:r>
+            <a:r>
+              <a:rPr lang="en-US" sz="1400" b="0" dirty="0">
+                <a:solidFill>
+                  <a:srgbClr val="0000FF"/>
+                </a:solidFill>
+                <a:effectLst/>
+                <a:latin typeface="Consolas" panose="020B0609020204030204" pitchFamily="49" charset="0"/>
+              </a:rPr>
               <a:t>end</a:t>
             </a:r>
-            <a:endParaRPr lang="en-US" sz="1600" b="0" dirty="0">
+            <a:r>
+              <a:rPr lang="en-US" sz="1400" b="0" dirty="0">
+                <a:solidFill>
+                  <a:srgbClr val="000000"/>
+                </a:solidFill>
+                <a:effectLst/>
+                <a:latin typeface="Consolas" panose="020B0609020204030204" pitchFamily="49" charset="0"/>
+              </a:rPr>
+              <a:t>)}</a:t>
+            </a:r>
+          </a:p>
+          <a:p>
+            <a:pPr>
+              <a:lnSpc>
+                <a:spcPts val="1425"/>
+              </a:lnSpc>
+            </a:pPr>
+            <a:r>
+              <a:rPr lang="en-US" sz="1400" b="0" dirty="0">
+                <a:solidFill>
+                  <a:srgbClr val="000000"/>
+                </a:solidFill>
+                <a:effectLst/>
+                <a:latin typeface="Consolas" panose="020B0609020204030204" pitchFamily="49" charset="0"/>
+              </a:rPr>
+              <a:t>  </a:t>
+            </a:r>
+            <a:r>
+              <a:rPr lang="en-US" sz="1400" b="0" dirty="0">
+                <a:solidFill>
+                  <a:srgbClr val="0000FF"/>
+                </a:solidFill>
+                <a:effectLst/>
+                <a:latin typeface="Consolas" panose="020B0609020204030204" pitchFamily="49" charset="0"/>
+              </a:rPr>
+              <a:t>end</a:t>
+            </a:r>
+            <a:endParaRPr lang="en-US" sz="1400" b="0" dirty="0">
+              <a:solidFill>
+                <a:srgbClr val="000000"/>
+              </a:solidFill>
+              <a:effectLst/>
+              <a:latin typeface="Consolas" panose="020B0609020204030204" pitchFamily="49" charset="0"/>
+            </a:endParaRPr>
+          </a:p>
+          <a:p>
+            <a:pPr>
+              <a:lnSpc>
+                <a:spcPts val="1425"/>
+              </a:lnSpc>
+            </a:pPr>
+            <a:r>
+              <a:rPr lang="en-US" sz="1400" b="0" dirty="0">
+                <a:solidFill>
+                  <a:srgbClr val="0000FF"/>
+                </a:solidFill>
+                <a:effectLst/>
+                <a:latin typeface="Consolas" panose="020B0609020204030204" pitchFamily="49" charset="0"/>
+              </a:rPr>
+              <a:t>end</a:t>
+            </a:r>
+            <a:endParaRPr lang="en-US" sz="1400" b="0" dirty="0">
               <a:solidFill>
                 <a:srgbClr val="000000"/>
               </a:solidFill>
@@ -5021,7 +5970,7 @@
 </p:sld>
 </file>
 
-<file path=ppt/slides/slide16.xml><?xml version="1.0" encoding="utf-8"?>
+<file path=ppt/slides/slide18.xml><?xml version="1.0" encoding="utf-8"?>
 <p:sld xmlns:a="http://schemas.openxmlformats.org/drawingml/2006/main" xmlns:r="http://schemas.openxmlformats.org/officeDocument/2006/relationships" xmlns:p="http://schemas.openxmlformats.org/presentationml/2006/main">
   <p:cSld>
     <p:spTree>
@@ -5162,7 +6111,7 @@
 </p:sld>
 </file>
 
-<file path=ppt/slides/slide17.xml><?xml version="1.0" encoding="utf-8"?>
+<file path=ppt/slides/slide19.xml><?xml version="1.0" encoding="utf-8"?>
 <p:sld xmlns:a="http://schemas.openxmlformats.org/drawingml/2006/main" xmlns:r="http://schemas.openxmlformats.org/officeDocument/2006/relationships" xmlns:p="http://schemas.openxmlformats.org/presentationml/2006/main">
   <p:cSld>
     <p:spTree>
@@ -5309,174 +6258,6 @@
 </p:sld>
 </file>
 
-<file path=ppt/slides/slide18.xml><?xml version="1.0" encoding="utf-8"?>
-<p:sld xmlns:a="http://schemas.openxmlformats.org/drawingml/2006/main" xmlns:r="http://schemas.openxmlformats.org/officeDocument/2006/relationships" xmlns:p="http://schemas.openxmlformats.org/presentationml/2006/main">
-  <p:cSld>
-    <p:spTree>
-      <p:nvGrpSpPr>
-        <p:cNvPr id="1" name=""/>
-        <p:cNvGrpSpPr/>
-        <p:nvPr/>
-      </p:nvGrpSpPr>
-      <p:grpSpPr>
-        <a:xfrm>
-          <a:off x="0" y="0"/>
-          <a:ext cx="0" cy="0"/>
-          <a:chOff x="0" y="0"/>
-          <a:chExt cx="0" cy="0"/>
-        </a:xfrm>
-      </p:grpSpPr>
-      <p:sp>
-        <p:nvSpPr>
-          <p:cNvPr id="2" name="Title 1">
-            <a:extLst>
-              <a:ext uri="{FF2B5EF4-FFF2-40B4-BE49-F238E27FC236}">
-                <a16:creationId xmlns:a16="http://schemas.microsoft.com/office/drawing/2014/main" id="{79EE08F3-5D90-4DF6-96DA-31714BCF32BF}"/>
-              </a:ext>
-            </a:extLst>
-          </p:cNvPr>
-          <p:cNvSpPr>
-            <a:spLocks noGrp="1"/>
-          </p:cNvSpPr>
-          <p:nvPr>
-            <p:ph type="title"/>
-          </p:nvPr>
-        </p:nvSpPr>
-        <p:spPr/>
-        <p:txBody>
-          <a:bodyPr/>
-          <a:lstStyle/>
-          <a:p>
-            <a:r>
-              <a:rPr lang="en-US" dirty="0"/>
-              <a:t>Q &amp; A</a:t>
-            </a:r>
-          </a:p>
-        </p:txBody>
-      </p:sp>
-      <p:sp>
-        <p:nvSpPr>
-          <p:cNvPr id="3" name="Text Placeholder 2">
-            <a:extLst>
-              <a:ext uri="{FF2B5EF4-FFF2-40B4-BE49-F238E27FC236}">
-                <a16:creationId xmlns:a16="http://schemas.microsoft.com/office/drawing/2014/main" id="{1D1EDDDB-BF45-4C61-823B-9FB45ED6F51F}"/>
-              </a:ext>
-            </a:extLst>
-          </p:cNvPr>
-          <p:cNvSpPr>
-            <a:spLocks noGrp="1"/>
-          </p:cNvSpPr>
-          <p:nvPr>
-            <p:ph type="body" sz="half" idx="1"/>
-          </p:nvPr>
-        </p:nvSpPr>
-        <p:spPr/>
-        <p:txBody>
-          <a:bodyPr/>
-          <a:lstStyle/>
-          <a:p>
-            <a:endParaRPr lang="en-US"/>
-          </a:p>
-        </p:txBody>
-      </p:sp>
-    </p:spTree>
-    <p:extLst>
-      <p:ext uri="{BB962C8B-B14F-4D97-AF65-F5344CB8AC3E}">
-        <p14:creationId xmlns:p14="http://schemas.microsoft.com/office/powerpoint/2010/main" val="2873828072"/>
-      </p:ext>
-    </p:extLst>
-  </p:cSld>
-  <p:clrMapOvr>
-    <a:masterClrMapping/>
-  </p:clrMapOvr>
-  <p:transition spd="med"/>
-</p:sld>
-</file>
-
-<file path=ppt/slides/slide19.xml><?xml version="1.0" encoding="utf-8"?>
-<p:sld xmlns:a="http://schemas.openxmlformats.org/drawingml/2006/main" xmlns:r="http://schemas.openxmlformats.org/officeDocument/2006/relationships" xmlns:p="http://schemas.openxmlformats.org/presentationml/2006/main">
-  <p:cSld>
-    <p:spTree>
-      <p:nvGrpSpPr>
-        <p:cNvPr id="1" name=""/>
-        <p:cNvGrpSpPr/>
-        <p:nvPr/>
-      </p:nvGrpSpPr>
-      <p:grpSpPr>
-        <a:xfrm>
-          <a:off x="0" y="0"/>
-          <a:ext cx="0" cy="0"/>
-          <a:chOff x="0" y="0"/>
-          <a:chExt cx="0" cy="0"/>
-        </a:xfrm>
-      </p:grpSpPr>
-      <p:sp>
-        <p:nvSpPr>
-          <p:cNvPr id="2" name="Title 1">
-            <a:extLst>
-              <a:ext uri="{FF2B5EF4-FFF2-40B4-BE49-F238E27FC236}">
-                <a16:creationId xmlns:a16="http://schemas.microsoft.com/office/drawing/2014/main" id="{79EE08F3-5D90-4DF6-96DA-31714BCF32BF}"/>
-              </a:ext>
-            </a:extLst>
-          </p:cNvPr>
-          <p:cNvSpPr>
-            <a:spLocks noGrp="1"/>
-          </p:cNvSpPr>
-          <p:nvPr>
-            <p:ph type="title"/>
-          </p:nvPr>
-        </p:nvSpPr>
-        <p:spPr/>
-        <p:txBody>
-          <a:bodyPr/>
-          <a:lstStyle/>
-          <a:p>
-            <a:r>
-              <a:rPr lang="en-US" dirty="0"/>
-              <a:t>Thank you</a:t>
-            </a:r>
-          </a:p>
-        </p:txBody>
-      </p:sp>
-      <p:sp>
-        <p:nvSpPr>
-          <p:cNvPr id="3" name="Text Placeholder 2">
-            <a:extLst>
-              <a:ext uri="{FF2B5EF4-FFF2-40B4-BE49-F238E27FC236}">
-                <a16:creationId xmlns:a16="http://schemas.microsoft.com/office/drawing/2014/main" id="{1D1EDDDB-BF45-4C61-823B-9FB45ED6F51F}"/>
-              </a:ext>
-            </a:extLst>
-          </p:cNvPr>
-          <p:cNvSpPr>
-            <a:spLocks noGrp="1"/>
-          </p:cNvSpPr>
-          <p:nvPr>
-            <p:ph type="body" sz="half" idx="1"/>
-          </p:nvPr>
-        </p:nvSpPr>
-        <p:spPr/>
-        <p:txBody>
-          <a:bodyPr/>
-          <a:lstStyle/>
-          <a:p>
-            <a:endParaRPr lang="en-US"/>
-          </a:p>
-        </p:txBody>
-      </p:sp>
-    </p:spTree>
-    <p:extLst>
-      <p:ext uri="{BB962C8B-B14F-4D97-AF65-F5344CB8AC3E}">
-        <p14:creationId xmlns:p14="http://schemas.microsoft.com/office/powerpoint/2010/main" val="2384320704"/>
-      </p:ext>
-    </p:extLst>
-  </p:cSld>
-  <p:clrMapOvr>
-    <a:masterClrMapping/>
-  </p:clrMapOvr>
-  <p:transition spd="med"/>
-</p:sld>
-</file>
-
 <file path=ppt/slides/slide2.xml><?xml version="1.0" encoding="utf-8"?>
 <p:sld xmlns:a="http://schemas.openxmlformats.org/drawingml/2006/main" xmlns:r="http://schemas.openxmlformats.org/officeDocument/2006/relationships" xmlns:p="http://schemas.openxmlformats.org/presentationml/2006/main">
   <p:cSld>
@@ -5634,6 +6415,174 @@
     <p:extLst>
       <p:ext uri="{BB962C8B-B14F-4D97-AF65-F5344CB8AC3E}">
         <p14:creationId xmlns:p14="http://schemas.microsoft.com/office/powerpoint/2010/main" val="3867284249"/>
+      </p:ext>
+    </p:extLst>
+  </p:cSld>
+  <p:clrMapOvr>
+    <a:masterClrMapping/>
+  </p:clrMapOvr>
+  <p:transition spd="med"/>
+</p:sld>
+</file>
+
+<file path=ppt/slides/slide20.xml><?xml version="1.0" encoding="utf-8"?>
+<p:sld xmlns:a="http://schemas.openxmlformats.org/drawingml/2006/main" xmlns:r="http://schemas.openxmlformats.org/officeDocument/2006/relationships" xmlns:p="http://schemas.openxmlformats.org/presentationml/2006/main">
+  <p:cSld>
+    <p:spTree>
+      <p:nvGrpSpPr>
+        <p:cNvPr id="1" name=""/>
+        <p:cNvGrpSpPr/>
+        <p:nvPr/>
+      </p:nvGrpSpPr>
+      <p:grpSpPr>
+        <a:xfrm>
+          <a:off x="0" y="0"/>
+          <a:ext cx="0" cy="0"/>
+          <a:chOff x="0" y="0"/>
+          <a:chExt cx="0" cy="0"/>
+        </a:xfrm>
+      </p:grpSpPr>
+      <p:sp>
+        <p:nvSpPr>
+          <p:cNvPr id="2" name="Title 1">
+            <a:extLst>
+              <a:ext uri="{FF2B5EF4-FFF2-40B4-BE49-F238E27FC236}">
+                <a16:creationId xmlns:a16="http://schemas.microsoft.com/office/drawing/2014/main" id="{79EE08F3-5D90-4DF6-96DA-31714BCF32BF}"/>
+              </a:ext>
+            </a:extLst>
+          </p:cNvPr>
+          <p:cNvSpPr>
+            <a:spLocks noGrp="1"/>
+          </p:cNvSpPr>
+          <p:nvPr>
+            <p:ph type="title"/>
+          </p:nvPr>
+        </p:nvSpPr>
+        <p:spPr/>
+        <p:txBody>
+          <a:bodyPr/>
+          <a:lstStyle/>
+          <a:p>
+            <a:r>
+              <a:rPr lang="en-US" dirty="0"/>
+              <a:t>Q &amp; A</a:t>
+            </a:r>
+          </a:p>
+        </p:txBody>
+      </p:sp>
+      <p:sp>
+        <p:nvSpPr>
+          <p:cNvPr id="3" name="Text Placeholder 2">
+            <a:extLst>
+              <a:ext uri="{FF2B5EF4-FFF2-40B4-BE49-F238E27FC236}">
+                <a16:creationId xmlns:a16="http://schemas.microsoft.com/office/drawing/2014/main" id="{1D1EDDDB-BF45-4C61-823B-9FB45ED6F51F}"/>
+              </a:ext>
+            </a:extLst>
+          </p:cNvPr>
+          <p:cNvSpPr>
+            <a:spLocks noGrp="1"/>
+          </p:cNvSpPr>
+          <p:nvPr>
+            <p:ph type="body" sz="half" idx="1"/>
+          </p:nvPr>
+        </p:nvSpPr>
+        <p:spPr/>
+        <p:txBody>
+          <a:bodyPr/>
+          <a:lstStyle/>
+          <a:p>
+            <a:endParaRPr lang="en-US"/>
+          </a:p>
+        </p:txBody>
+      </p:sp>
+    </p:spTree>
+    <p:extLst>
+      <p:ext uri="{BB962C8B-B14F-4D97-AF65-F5344CB8AC3E}">
+        <p14:creationId xmlns:p14="http://schemas.microsoft.com/office/powerpoint/2010/main" val="2873828072"/>
+      </p:ext>
+    </p:extLst>
+  </p:cSld>
+  <p:clrMapOvr>
+    <a:masterClrMapping/>
+  </p:clrMapOvr>
+  <p:transition spd="med"/>
+</p:sld>
+</file>
+
+<file path=ppt/slides/slide21.xml><?xml version="1.0" encoding="utf-8"?>
+<p:sld xmlns:a="http://schemas.openxmlformats.org/drawingml/2006/main" xmlns:r="http://schemas.openxmlformats.org/officeDocument/2006/relationships" xmlns:p="http://schemas.openxmlformats.org/presentationml/2006/main">
+  <p:cSld>
+    <p:spTree>
+      <p:nvGrpSpPr>
+        <p:cNvPr id="1" name=""/>
+        <p:cNvGrpSpPr/>
+        <p:nvPr/>
+      </p:nvGrpSpPr>
+      <p:grpSpPr>
+        <a:xfrm>
+          <a:off x="0" y="0"/>
+          <a:ext cx="0" cy="0"/>
+          <a:chOff x="0" y="0"/>
+          <a:chExt cx="0" cy="0"/>
+        </a:xfrm>
+      </p:grpSpPr>
+      <p:sp>
+        <p:nvSpPr>
+          <p:cNvPr id="2" name="Title 1">
+            <a:extLst>
+              <a:ext uri="{FF2B5EF4-FFF2-40B4-BE49-F238E27FC236}">
+                <a16:creationId xmlns:a16="http://schemas.microsoft.com/office/drawing/2014/main" id="{79EE08F3-5D90-4DF6-96DA-31714BCF32BF}"/>
+              </a:ext>
+            </a:extLst>
+          </p:cNvPr>
+          <p:cNvSpPr>
+            <a:spLocks noGrp="1"/>
+          </p:cNvSpPr>
+          <p:nvPr>
+            <p:ph type="title"/>
+          </p:nvPr>
+        </p:nvSpPr>
+        <p:spPr/>
+        <p:txBody>
+          <a:bodyPr/>
+          <a:lstStyle/>
+          <a:p>
+            <a:r>
+              <a:rPr lang="en-US" dirty="0"/>
+              <a:t>Thank you</a:t>
+            </a:r>
+          </a:p>
+        </p:txBody>
+      </p:sp>
+      <p:sp>
+        <p:nvSpPr>
+          <p:cNvPr id="3" name="Text Placeholder 2">
+            <a:extLst>
+              <a:ext uri="{FF2B5EF4-FFF2-40B4-BE49-F238E27FC236}">
+                <a16:creationId xmlns:a16="http://schemas.microsoft.com/office/drawing/2014/main" id="{1D1EDDDB-BF45-4C61-823B-9FB45ED6F51F}"/>
+              </a:ext>
+            </a:extLst>
+          </p:cNvPr>
+          <p:cNvSpPr>
+            <a:spLocks noGrp="1"/>
+          </p:cNvSpPr>
+          <p:nvPr>
+            <p:ph type="body" sz="half" idx="1"/>
+          </p:nvPr>
+        </p:nvSpPr>
+        <p:spPr/>
+        <p:txBody>
+          <a:bodyPr/>
+          <a:lstStyle/>
+          <a:p>
+            <a:endParaRPr lang="en-US"/>
+          </a:p>
+        </p:txBody>
+      </p:sp>
+    </p:spTree>
+    <p:extLst>
+      <p:ext uri="{BB962C8B-B14F-4D97-AF65-F5344CB8AC3E}">
+        <p14:creationId xmlns:p14="http://schemas.microsoft.com/office/powerpoint/2010/main" val="2384320704"/>
       </p:ext>
     </p:extLst>
   </p:cSld>
@@ -7606,7 +8555,7 @@
                 </a:highlight>
                 <a:latin typeface="Cascadia Code" panose="020B0609020000020004" pitchFamily="49" charset="0"/>
               </a:rPr>
-              <a:t>local.hex</a:t>
+              <a:t>phx.new</a:t>
             </a:r>
             <a:endParaRPr lang="en-US" sz="1800" b="0" dirty="0">
               <a:solidFill>
@@ -7635,8 +8584,8 @@
         </p:nvSpPr>
         <p:spPr>
           <a:xfrm>
-            <a:off x="1194816" y="5148073"/>
-            <a:ext cx="7053072" cy="444220"/>
+            <a:off x="1194816" y="4935482"/>
+            <a:ext cx="9558528" cy="942818"/>
           </a:xfrm>
           <a:prstGeom prst="rect">
             <a:avLst/>
@@ -7706,7 +8655,7 @@
                 </a:highlight>
                 <a:latin typeface="Cascadia Code" panose="020B0609020000020004" pitchFamily="49" charset="0"/>
               </a:rPr>
-              <a:t> hello --no-</a:t>
+              <a:t> </a:t>
             </a:r>
             <a:r>
               <a:rPr lang="en-US" sz="1800" dirty="0" err="1">
@@ -7718,7 +8667,7 @@
                 </a:highlight>
                 <a:latin typeface="Cascadia Code" panose="020B0609020000020004" pitchFamily="49" charset="0"/>
               </a:rPr>
-              <a:t>ecto</a:t>
+              <a:t>api_example</a:t>
             </a:r>
             <a:r>
               <a:rPr lang="en-US" sz="1800" dirty="0">
@@ -7730,7 +8679,55 @@
                 </a:highlight>
                 <a:latin typeface="Cascadia Code" panose="020B0609020000020004" pitchFamily="49" charset="0"/>
               </a:rPr>
-              <a:t> --no-html --no-assets</a:t>
+              <a:t> --no-html --no-assets --no-live --no-</a:t>
+            </a:r>
+            <a:r>
+              <a:rPr lang="en-US" sz="1800" dirty="0" err="1">
+                <a:solidFill>
+                  <a:srgbClr val="24292E"/>
+                </a:solidFill>
+                <a:highlight>
+                  <a:srgbClr val="F9F9F9"/>
+                </a:highlight>
+                <a:latin typeface="Cascadia Code" panose="020B0609020000020004" pitchFamily="49" charset="0"/>
+              </a:rPr>
+              <a:t>esbuild</a:t>
+            </a:r>
+            <a:r>
+              <a:rPr lang="en-US" sz="1800" dirty="0">
+                <a:solidFill>
+                  <a:srgbClr val="24292E"/>
+                </a:solidFill>
+                <a:highlight>
+                  <a:srgbClr val="F9F9F9"/>
+                </a:highlight>
+                <a:latin typeface="Cascadia Code" panose="020B0609020000020004" pitchFamily="49" charset="0"/>
+              </a:rPr>
+              <a:t> --no-tailwind --no-dashboard --no-</a:t>
+            </a:r>
+            <a:r>
+              <a:rPr lang="en-US" sz="1800" dirty="0" err="1">
+                <a:solidFill>
+                  <a:srgbClr val="24292E"/>
+                </a:solidFill>
+                <a:highlight>
+                  <a:srgbClr val="F9F9F9"/>
+                </a:highlight>
+                <a:latin typeface="Cascadia Code" panose="020B0609020000020004" pitchFamily="49" charset="0"/>
+              </a:rPr>
+              <a:t>gettext</a:t>
+            </a:r>
+            <a:r>
+              <a:rPr lang="en-US" sz="1800" dirty="0">
+                <a:solidFill>
+                  <a:srgbClr val="24292E"/>
+                </a:solidFill>
+                <a:highlight>
+                  <a:srgbClr val="F9F9F9"/>
+                </a:highlight>
+                <a:latin typeface="Cascadia Code" panose="020B0609020000020004" pitchFamily="49" charset="0"/>
+              </a:rPr>
+              <a:t> --no-mailer --database sqlite3</a:t>
             </a:r>
             <a:endParaRPr lang="en-US" sz="1800" b="0" dirty="0">
               <a:solidFill>

</xml_diff>

<commit_message>
Updated day 3 homework
</commit_message>
<xml_diff>
--- a/day3/Elixir - Day 3.pptx
+++ b/day3/Elixir - Day 3.pptx
@@ -5,7 +5,7 @@
     <p:sldMasterId id="2147483648" r:id="rId5"/>
   </p:sldMasterIdLst>
   <p:notesMasterIdLst>
-    <p:notesMasterId r:id="rId27"/>
+    <p:notesMasterId r:id="rId28"/>
   </p:notesMasterIdLst>
   <p:sldIdLst>
     <p:sldId id="276" r:id="rId6"/>
@@ -27,8 +27,9 @@
     <p:sldId id="341" r:id="rId22"/>
     <p:sldId id="343" r:id="rId23"/>
     <p:sldId id="342" r:id="rId24"/>
-    <p:sldId id="287" r:id="rId25"/>
-    <p:sldId id="299" r:id="rId26"/>
+    <p:sldId id="347" r:id="rId25"/>
+    <p:sldId id="287" r:id="rId26"/>
+    <p:sldId id="299" r:id="rId27"/>
   </p:sldIdLst>
   <p:sldSz cx="12192000" cy="6858000"/>
   <p:notesSz cx="6858000" cy="9144000"/>
@@ -1046,7 +1047,7 @@
           </a:ln>
           <a:extLst>
             <a:ext uri="{C572A759-6A51-4108-AA02-DFA0A04FC94B}">
-              <ma14:wrappingTextBoxFlag xmlns="" xmlns:ma14="http://schemas.microsoft.com/office/mac/drawingml/2011/main" xmlns:a14="http://schemas.microsoft.com/office/drawing/2010/main" xmlns:m="http://schemas.openxmlformats.org/officeDocument/2006/math" val="1"/>
+              <ma14:wrappingTextBoxFlag xmlns:m="http://schemas.openxmlformats.org/officeDocument/2006/math" xmlns:a14="http://schemas.microsoft.com/office/drawing/2010/main" xmlns:ma14="http://schemas.microsoft.com/office/mac/drawingml/2011/main" xmlns="" val="1"/>
             </a:ext>
           </a:extLst>
         </p:spPr>
@@ -1321,7 +1322,7 @@
           </a:ln>
           <a:extLst>
             <a:ext uri="{C572A759-6A51-4108-AA02-DFA0A04FC94B}">
-              <ma14:wrappingTextBoxFlag xmlns="" xmlns:ma14="http://schemas.microsoft.com/office/mac/drawingml/2011/main" xmlns:a14="http://schemas.microsoft.com/office/drawing/2010/main" xmlns:m="http://schemas.openxmlformats.org/officeDocument/2006/math" val="1"/>
+              <ma14:wrappingTextBoxFlag xmlns:m="http://schemas.openxmlformats.org/officeDocument/2006/math" xmlns:a14="http://schemas.microsoft.com/office/drawing/2010/main" xmlns:ma14="http://schemas.microsoft.com/office/mac/drawingml/2011/main" xmlns="" val="1"/>
             </a:ext>
           </a:extLst>
         </p:spPr>
@@ -1760,7 +1761,7 @@
           </a:ln>
           <a:extLst>
             <a:ext uri="{C572A759-6A51-4108-AA02-DFA0A04FC94B}">
-              <ma14:wrappingTextBoxFlag xmlns="" xmlns:ma14="http://schemas.microsoft.com/office/mac/drawingml/2011/main" xmlns:a14="http://schemas.microsoft.com/office/drawing/2010/main" xmlns:m="http://schemas.openxmlformats.org/officeDocument/2006/math" val="1"/>
+              <ma14:wrappingTextBoxFlag xmlns:m="http://schemas.openxmlformats.org/officeDocument/2006/math" xmlns:a14="http://schemas.microsoft.com/office/drawing/2010/main" xmlns:ma14="http://schemas.microsoft.com/office/mac/drawingml/2011/main" xmlns="" val="1"/>
             </a:ext>
           </a:extLst>
         </p:spPr>
@@ -1980,7 +1981,7 @@
           </a:ln>
           <a:extLst>
             <a:ext uri="{C572A759-6A51-4108-AA02-DFA0A04FC94B}">
-              <ma14:wrappingTextBoxFlag xmlns="" xmlns:ma14="http://schemas.microsoft.com/office/mac/drawingml/2011/main" xmlns:a14="http://schemas.microsoft.com/office/drawing/2010/main" xmlns:m="http://schemas.openxmlformats.org/officeDocument/2006/math" val="1"/>
+              <ma14:wrappingTextBoxFlag xmlns:m="http://schemas.openxmlformats.org/officeDocument/2006/math" xmlns:a14="http://schemas.microsoft.com/office/drawing/2010/main" xmlns:ma14="http://schemas.microsoft.com/office/mac/drawingml/2011/main" xmlns="" val="1"/>
             </a:ext>
           </a:extLst>
         </p:spPr>
@@ -2181,7 +2182,7 @@
           </a:ln>
           <a:extLst>
             <a:ext uri="{C572A759-6A51-4108-AA02-DFA0A04FC94B}">
-              <ma14:wrappingTextBoxFlag xmlns="" xmlns:ma14="http://schemas.microsoft.com/office/mac/drawingml/2011/main" xmlns:a14="http://schemas.microsoft.com/office/drawing/2010/main" xmlns:m="http://schemas.openxmlformats.org/officeDocument/2006/math" val="1"/>
+              <ma14:wrappingTextBoxFlag xmlns:m="http://schemas.openxmlformats.org/officeDocument/2006/math" xmlns:a14="http://schemas.microsoft.com/office/drawing/2010/main" xmlns:ma14="http://schemas.microsoft.com/office/mac/drawingml/2011/main" xmlns="" val="1"/>
             </a:ext>
           </a:extLst>
         </p:spPr>
@@ -2280,7 +2281,7 @@
           </a:ln>
           <a:extLst>
             <a:ext uri="{C572A759-6A51-4108-AA02-DFA0A04FC94B}">
-              <ma14:wrappingTextBoxFlag xmlns="" xmlns:ma14="http://schemas.microsoft.com/office/mac/drawingml/2011/main" xmlns:a14="http://schemas.microsoft.com/office/drawing/2010/main" xmlns:m="http://schemas.openxmlformats.org/officeDocument/2006/math" val="1"/>
+              <ma14:wrappingTextBoxFlag xmlns:m="http://schemas.openxmlformats.org/officeDocument/2006/math" xmlns:a14="http://schemas.microsoft.com/office/drawing/2010/main" xmlns:ma14="http://schemas.microsoft.com/office/mac/drawingml/2011/main" xmlns="" val="1"/>
             </a:ext>
           </a:extLst>
         </p:spPr>
@@ -2319,7 +2320,7 @@
           </a:ln>
           <a:extLst>
             <a:ext uri="{C572A759-6A51-4108-AA02-DFA0A04FC94B}">
-              <ma14:wrappingTextBoxFlag xmlns="" xmlns:ma14="http://schemas.microsoft.com/office/mac/drawingml/2011/main" xmlns:a14="http://schemas.microsoft.com/office/drawing/2010/main" xmlns:m="http://schemas.openxmlformats.org/officeDocument/2006/math" val="1"/>
+              <ma14:wrappingTextBoxFlag xmlns:m="http://schemas.openxmlformats.org/officeDocument/2006/math" xmlns:a14="http://schemas.microsoft.com/office/drawing/2010/main" xmlns:ma14="http://schemas.microsoft.com/office/mac/drawingml/2011/main" xmlns="" val="1"/>
             </a:ext>
           </a:extLst>
         </p:spPr>
@@ -2479,7 +2480,7 @@
           </a:ln>
           <a:extLst>
             <a:ext uri="{C572A759-6A51-4108-AA02-DFA0A04FC94B}">
-              <ma14:wrappingTextBoxFlag xmlns="" xmlns:ma14="http://schemas.microsoft.com/office/mac/drawingml/2011/main" xmlns:a14="http://schemas.microsoft.com/office/drawing/2010/main" xmlns:m="http://schemas.openxmlformats.org/officeDocument/2006/math" val="1"/>
+              <ma14:wrappingTextBoxFlag xmlns:m="http://schemas.openxmlformats.org/officeDocument/2006/math" xmlns:a14="http://schemas.microsoft.com/office/drawing/2010/main" xmlns:ma14="http://schemas.microsoft.com/office/mac/drawingml/2011/main" xmlns="" val="1"/>
             </a:ext>
           </a:extLst>
         </p:spPr>
@@ -6444,6 +6445,126 @@
       </p:grpSpPr>
       <p:sp>
         <p:nvSpPr>
+          <p:cNvPr id="4" name="Title 3">
+            <a:extLst>
+              <a:ext uri="{FF2B5EF4-FFF2-40B4-BE49-F238E27FC236}">
+                <a16:creationId xmlns:a16="http://schemas.microsoft.com/office/drawing/2014/main" id="{14CB4D1E-4C6A-1383-A14F-192220A1AF62}"/>
+              </a:ext>
+            </a:extLst>
+          </p:cNvPr>
+          <p:cNvSpPr>
+            <a:spLocks noGrp="1"/>
+          </p:cNvSpPr>
+          <p:nvPr>
+            <p:ph type="title"/>
+          </p:nvPr>
+        </p:nvSpPr>
+        <p:spPr/>
+        <p:txBody>
+          <a:bodyPr/>
+          <a:lstStyle/>
+          <a:p>
+            <a:r>
+              <a:rPr lang="en-US" dirty="0"/>
+              <a:t>Homework</a:t>
+            </a:r>
+            <a:endParaRPr lang="bg-BG" dirty="0"/>
+          </a:p>
+        </p:txBody>
+      </p:sp>
+      <p:sp>
+        <p:nvSpPr>
+          <p:cNvPr id="5" name="Text Placeholder 4">
+            <a:extLst>
+              <a:ext uri="{FF2B5EF4-FFF2-40B4-BE49-F238E27FC236}">
+                <a16:creationId xmlns:a16="http://schemas.microsoft.com/office/drawing/2014/main" id="{0B865E72-557E-33D1-C34E-79235E331D6E}"/>
+              </a:ext>
+            </a:extLst>
+          </p:cNvPr>
+          <p:cNvSpPr>
+            <a:spLocks noGrp="1"/>
+          </p:cNvSpPr>
+          <p:nvPr>
+            <p:ph type="body" idx="1"/>
+          </p:nvPr>
+        </p:nvSpPr>
+        <p:spPr/>
+        <p:txBody>
+          <a:bodyPr/>
+          <a:lstStyle/>
+          <a:p>
+            <a:r>
+              <a:rPr lang="en-US" dirty="0">
+                <a:hlinkClick r:id="rId2"/>
+              </a:rPr>
+              <a:t>https://github.com/georgiyolovski/elixir-workshop/tree/main/day3/homework</a:t>
+            </a:r>
+            <a:endParaRPr lang="en-US" dirty="0"/>
+          </a:p>
+          <a:p>
+            <a:endParaRPr lang="en-US" dirty="0"/>
+          </a:p>
+          <a:p>
+            <a:r>
+              <a:rPr lang="en-US" dirty="0"/>
+              <a:t>The following module references might be helpful:</a:t>
+            </a:r>
+          </a:p>
+          <a:p>
+            <a:pPr lvl="1"/>
+            <a:r>
+              <a:rPr lang="en-US" dirty="0">
+                <a:hlinkClick r:id="rId3"/>
+              </a:rPr>
+              <a:t>https://hexdocs.pm/phoenix/Mix.Tasks.Phx.New.html</a:t>
+            </a:r>
+            <a:endParaRPr lang="en-US" dirty="0"/>
+          </a:p>
+          <a:p>
+            <a:pPr lvl="1"/>
+            <a:r>
+              <a:rPr lang="en-US" dirty="0">
+                <a:hlinkClick r:id="rId4"/>
+              </a:rPr>
+              <a:t>https://hexdocs.pm/phoenix/Mix.Tasks.Phx.Gen.Json.html</a:t>
+            </a:r>
+            <a:endParaRPr lang="bg-BG" dirty="0"/>
+          </a:p>
+        </p:txBody>
+      </p:sp>
+    </p:spTree>
+    <p:extLst>
+      <p:ext uri="{BB962C8B-B14F-4D97-AF65-F5344CB8AC3E}">
+        <p14:creationId xmlns:p14="http://schemas.microsoft.com/office/powerpoint/2010/main" val="1742023883"/>
+      </p:ext>
+    </p:extLst>
+  </p:cSld>
+  <p:clrMapOvr>
+    <a:masterClrMapping/>
+  </p:clrMapOvr>
+  <p:transition spd="med"/>
+</p:sld>
+</file>
+
+<file path=ppt/slides/slide21.xml><?xml version="1.0" encoding="utf-8"?>
+<p:sld xmlns:a="http://schemas.openxmlformats.org/drawingml/2006/main" xmlns:r="http://schemas.openxmlformats.org/officeDocument/2006/relationships" xmlns:p="http://schemas.openxmlformats.org/presentationml/2006/main">
+  <p:cSld>
+    <p:spTree>
+      <p:nvGrpSpPr>
+        <p:cNvPr id="1" name=""/>
+        <p:cNvGrpSpPr/>
+        <p:nvPr/>
+      </p:nvGrpSpPr>
+      <p:grpSpPr>
+        <a:xfrm>
+          <a:off x="0" y="0"/>
+          <a:ext cx="0" cy="0"/>
+          <a:chOff x="0" y="0"/>
+          <a:chExt cx="0" cy="0"/>
+        </a:xfrm>
+      </p:grpSpPr>
+      <p:sp>
+        <p:nvSpPr>
           <p:cNvPr id="2" name="Title 1">
             <a:extLst>
               <a:ext uri="{FF2B5EF4-FFF2-40B4-BE49-F238E27FC236}">
@@ -6509,7 +6630,7 @@
 </p:sld>
 </file>
 
-<file path=ppt/slides/slide21.xml><?xml version="1.0" encoding="utf-8"?>
+<file path=ppt/slides/slide22.xml><?xml version="1.0" encoding="utf-8"?>
 <p:sld xmlns:a="http://schemas.openxmlformats.org/drawingml/2006/main" xmlns:r="http://schemas.openxmlformats.org/officeDocument/2006/relationships" xmlns:p="http://schemas.openxmlformats.org/presentationml/2006/main">
   <p:cSld>
     <p:spTree>
@@ -11315,6 +11436,56 @@
 </file>
 
 <file path=customXml/item1.xml><?xml version="1.0" encoding="utf-8"?>
+<?mso-contentType ?>
+<spe:Receivers xmlns:spe="http://schemas.microsoft.com/sharepoint/events">
+  <Receiver>
+    <Name>Document ID Generator</Name>
+    <Synchronization>Synchronous</Synchronization>
+    <Type>10001</Type>
+    <SequenceNumber>1000</SequenceNumber>
+    <Url/>
+    <Assembly>Microsoft.Office.DocumentManagement, Version=16.0.0.0, Culture=neutral, PublicKeyToken=71e9bce111e9429c</Assembly>
+    <Class>Microsoft.Office.DocumentManagement.Internal.DocIdHandler</Class>
+    <Data/>
+    <Filter/>
+  </Receiver>
+  <Receiver>
+    <Name>Document ID Generator</Name>
+    <Synchronization>Synchronous</Synchronization>
+    <Type>10002</Type>
+    <SequenceNumber>1001</SequenceNumber>
+    <Url/>
+    <Assembly>Microsoft.Office.DocumentManagement, Version=16.0.0.0, Culture=neutral, PublicKeyToken=71e9bce111e9429c</Assembly>
+    <Class>Microsoft.Office.DocumentManagement.Internal.DocIdHandler</Class>
+    <Data/>
+    <Filter/>
+  </Receiver>
+  <Receiver>
+    <Name>Document ID Generator</Name>
+    <Synchronization>Synchronous</Synchronization>
+    <Type>10004</Type>
+    <SequenceNumber>1002</SequenceNumber>
+    <Url/>
+    <Assembly>Microsoft.Office.DocumentManagement, Version=16.0.0.0, Culture=neutral, PublicKeyToken=71e9bce111e9429c</Assembly>
+    <Class>Microsoft.Office.DocumentManagement.Internal.DocIdHandler</Class>
+    <Data/>
+    <Filter/>
+  </Receiver>
+  <Receiver>
+    <Name>Document ID Generator</Name>
+    <Synchronization>Synchronous</Synchronization>
+    <Type>10006</Type>
+    <SequenceNumber>1003</SequenceNumber>
+    <Url/>
+    <Assembly>Microsoft.Office.DocumentManagement, Version=16.0.0.0, Culture=neutral, PublicKeyToken=71e9bce111e9429c</Assembly>
+    <Class>Microsoft.Office.DocumentManagement.Internal.DocIdHandler</Class>
+    <Data/>
+    <Filter/>
+  </Receiver>
+</spe:Receivers>
+</file>
+
+<file path=customXml/item2.xml><?xml version="1.0" encoding="utf-8"?>
 <ct:contentTypeSchema xmlns:ct="http://schemas.microsoft.com/office/2006/metadata/contentType" xmlns:ma="http://schemas.microsoft.com/office/2006/metadata/properties/metaAttributes" ct:_="" ma:_="" ma:contentTypeName="Document" ma:contentTypeID="0x0101003F118A156F01C84E8E5E451D60C9243C" ma:contentTypeVersion="18" ma:contentTypeDescription="Create a new document." ma:contentTypeScope="" ma:versionID="81bba4710e6ed34fea4bd7f33693d27f">
   <xsd:schema xmlns:xsd="http://www.w3.org/2001/XMLSchema" xmlns:xs="http://www.w3.org/2001/XMLSchema" xmlns:p="http://schemas.microsoft.com/office/2006/metadata/properties" xmlns:ns2="ee5a019c-1afb-4a7f-aa3c-a300d54b8a94" xmlns:ns3="3d51c85a-c808-4fa3-a7c4-399d30d41b71" xmlns:ns4="cabbaafa-9d61-4c96-bf36-3d40c487f168" targetNamespace="http://schemas.microsoft.com/office/2006/metadata/properties" ma:root="true" ma:fieldsID="ea50bd8bc227bb2cc5fe2d0a23ee5167" ns2:_="" ns3:_="" ns4:_="">
     <xsd:import namespace="ee5a019c-1afb-4a7f-aa3c-a300d54b8a94"/>
@@ -11587,57 +11758,16 @@
 </ct:contentTypeSchema>
 </file>
 
-<file path=customXml/item2.xml><?xml version="1.0" encoding="utf-8"?>
+<file path=customXml/item3.xml><?xml version="1.0" encoding="utf-8"?>
 <?mso-contentType ?>
-<spe:Receivers xmlns:spe="http://schemas.microsoft.com/sharepoint/events">
-  <Receiver>
-    <Name>Document ID Generator</Name>
-    <Synchronization>Synchronous</Synchronization>
-    <Type>10001</Type>
-    <SequenceNumber>1000</SequenceNumber>
-    <Url/>
-    <Assembly>Microsoft.Office.DocumentManagement, Version=16.0.0.0, Culture=neutral, PublicKeyToken=71e9bce111e9429c</Assembly>
-    <Class>Microsoft.Office.DocumentManagement.Internal.DocIdHandler</Class>
-    <Data/>
-    <Filter/>
-  </Receiver>
-  <Receiver>
-    <Name>Document ID Generator</Name>
-    <Synchronization>Synchronous</Synchronization>
-    <Type>10002</Type>
-    <SequenceNumber>1001</SequenceNumber>
-    <Url/>
-    <Assembly>Microsoft.Office.DocumentManagement, Version=16.0.0.0, Culture=neutral, PublicKeyToken=71e9bce111e9429c</Assembly>
-    <Class>Microsoft.Office.DocumentManagement.Internal.DocIdHandler</Class>
-    <Data/>
-    <Filter/>
-  </Receiver>
-  <Receiver>
-    <Name>Document ID Generator</Name>
-    <Synchronization>Synchronous</Synchronization>
-    <Type>10004</Type>
-    <SequenceNumber>1002</SequenceNumber>
-    <Url/>
-    <Assembly>Microsoft.Office.DocumentManagement, Version=16.0.0.0, Culture=neutral, PublicKeyToken=71e9bce111e9429c</Assembly>
-    <Class>Microsoft.Office.DocumentManagement.Internal.DocIdHandler</Class>
-    <Data/>
-    <Filter/>
-  </Receiver>
-  <Receiver>
-    <Name>Document ID Generator</Name>
-    <Synchronization>Synchronous</Synchronization>
-    <Type>10006</Type>
-    <SequenceNumber>1003</SequenceNumber>
-    <Url/>
-    <Assembly>Microsoft.Office.DocumentManagement, Version=16.0.0.0, Culture=neutral, PublicKeyToken=71e9bce111e9429c</Assembly>
-    <Class>Microsoft.Office.DocumentManagement.Internal.DocIdHandler</Class>
-    <Data/>
-    <Filter/>
-  </Receiver>
-</spe:Receivers>
+<FormTemplates xmlns="http://schemas.microsoft.com/sharepoint/v3/contenttype/forms">
+  <Display>DocumentLibraryForm</Display>
+  <Edit>DocumentLibraryForm</Edit>
+  <New>DocumentLibraryForm</New>
+</FormTemplates>
 </file>
 
-<file path=customXml/item3.xml><?xml version="1.0" encoding="utf-8"?>
+<file path=customXml/item4.xml><?xml version="1.0" encoding="utf-8"?>
 <p:properties xmlns:p="http://schemas.microsoft.com/office/2006/metadata/properties" xmlns:xsi="http://www.w3.org/2001/XMLSchema-instance" xmlns:pc="http://schemas.microsoft.com/office/infopath/2007/PartnerControls">
   <documentManagement>
     <_dlc_DocId xmlns="ee5a019c-1afb-4a7f-aa3c-a300d54b8a94">4ZA6FPYH4N22-134279970-49061</_dlc_DocId>
@@ -11653,16 +11783,15 @@
 </p:properties>
 </file>
 
-<file path=customXml/item4.xml><?xml version="1.0" encoding="utf-8"?>
-<?mso-contentType ?>
-<FormTemplates xmlns="http://schemas.microsoft.com/sharepoint/v3/contenttype/forms">
-  <Display>DocumentLibraryForm</Display>
-  <Edit>DocumentLibraryForm</Edit>
-  <New>DocumentLibraryForm</New>
-</FormTemplates>
+<file path=customXml/itemProps1.xml><?xml version="1.0" encoding="utf-8"?>
+<ds:datastoreItem xmlns:ds="http://schemas.openxmlformats.org/officeDocument/2006/customXml" ds:itemID="{23731FFE-AA89-41C8-A8D1-96335015AC7D}">
+  <ds:schemaRefs>
+    <ds:schemaRef ds:uri="http://schemas.microsoft.com/sharepoint/events"/>
+  </ds:schemaRefs>
+</ds:datastoreItem>
 </file>
 
-<file path=customXml/itemProps1.xml><?xml version="1.0" encoding="utf-8"?>
+<file path=customXml/itemProps2.xml><?xml version="1.0" encoding="utf-8"?>
 <ds:datastoreItem xmlns:ds="http://schemas.openxmlformats.org/officeDocument/2006/customXml" ds:itemID="{D75CE82B-2AB8-470D-8DBA-A4AFD7F9BDEE}">
   <ds:schemaRefs>
     <ds:schemaRef ds:uri="http://schemas.microsoft.com/office/2006/metadata/contentType"/>
@@ -11682,15 +11811,15 @@
 </ds:datastoreItem>
 </file>
 
-<file path=customXml/itemProps2.xml><?xml version="1.0" encoding="utf-8"?>
-<ds:datastoreItem xmlns:ds="http://schemas.openxmlformats.org/officeDocument/2006/customXml" ds:itemID="{23731FFE-AA89-41C8-A8D1-96335015AC7D}">
+<file path=customXml/itemProps3.xml><?xml version="1.0" encoding="utf-8"?>
+<ds:datastoreItem xmlns:ds="http://schemas.openxmlformats.org/officeDocument/2006/customXml" ds:itemID="{450D9D61-AB1C-42DB-97B3-F16948BBEDA5}">
   <ds:schemaRefs>
-    <ds:schemaRef ds:uri="http://schemas.microsoft.com/sharepoint/events"/>
+    <ds:schemaRef ds:uri="http://schemas.microsoft.com/sharepoint/v3/contenttype/forms"/>
   </ds:schemaRefs>
 </ds:datastoreItem>
 </file>
 
-<file path=customXml/itemProps3.xml><?xml version="1.0" encoding="utf-8"?>
+<file path=customXml/itemProps4.xml><?xml version="1.0" encoding="utf-8"?>
 <ds:datastoreItem xmlns:ds="http://schemas.openxmlformats.org/officeDocument/2006/customXml" ds:itemID="{28013F97-F744-428B-8504-911AB7D87FBC}">
   <ds:schemaRefs>
     <ds:schemaRef ds:uri="ee5a019c-1afb-4a7f-aa3c-a300d54b8a94"/>
@@ -11699,12 +11828,4 @@
     <ds:schemaRef ds:uri="3d51c85a-c808-4fa3-a7c4-399d30d41b71"/>
   </ds:schemaRefs>
 </ds:datastoreItem>
-</file>
-
-<file path=customXml/itemProps4.xml><?xml version="1.0" encoding="utf-8"?>
-<ds:datastoreItem xmlns:ds="http://schemas.openxmlformats.org/officeDocument/2006/customXml" ds:itemID="{450D9D61-AB1C-42DB-97B3-F16948BBEDA5}">
-  <ds:schemaRefs>
-    <ds:schemaRef ds:uri="http://schemas.microsoft.com/sharepoint/v3/contenttype/forms"/>
-  </ds:schemaRefs>
-</ds:datastoreItem>
 </file>
</xml_diff>